<commit_message>
puritán ppt kiegészítése (processzor)
</commit_message>
<xml_diff>
--- a/Puritánppt.pptx
+++ b/Puritánppt.pptx
@@ -15,7 +15,13 @@
     <p:sldId id="263" r:id="rId9"/>
     <p:sldId id="264" r:id="rId10"/>
     <p:sldId id="265" r:id="rId11"/>
-    <p:sldId id="266" r:id="rId12"/>
+    <p:sldId id="267" r:id="rId12"/>
+    <p:sldId id="268" r:id="rId13"/>
+    <p:sldId id="269" r:id="rId14"/>
+    <p:sldId id="270" r:id="rId15"/>
+    <p:sldId id="271" r:id="rId16"/>
+    <p:sldId id="272" r:id="rId17"/>
+    <p:sldId id="266" r:id="rId18"/>
   </p:sldIdLst>
   <p:sldSz cx="12192000" cy="6858000"/>
   <p:notesSz cx="6858000" cy="9144000"/>
@@ -114,6 +120,11 @@
       </a:defRPr>
     </a:lvl9pPr>
   </p:defaultTextStyle>
+  <p:extLst>
+    <p:ext uri="{EFAFB233-063F-42B5-8137-9DF3F51BA10A}">
+      <p15:sldGuideLst xmlns:p15="http://schemas.microsoft.com/office/powerpoint/2012/main"/>
+    </p:ext>
+  </p:extLst>
 </p:presentation>
 </file>
 
@@ -248,7 +259,7 @@
           <a:p>
             <a:fld id="{3501FAD6-AC86-4277-8AB6-0EB25B745D01}" type="datetimeFigureOut">
               <a:rPr lang="hu-HU" smtClean="0"/>
-              <a:t>2023.10.04.</a:t>
+              <a:t>2023.10.11.</a:t>
             </a:fld>
             <a:endParaRPr lang="hu-HU"/>
           </a:p>
@@ -418,7 +429,7 @@
           <a:p>
             <a:fld id="{3501FAD6-AC86-4277-8AB6-0EB25B745D01}" type="datetimeFigureOut">
               <a:rPr lang="hu-HU" smtClean="0"/>
-              <a:t>2023.10.04.</a:t>
+              <a:t>2023.10.11.</a:t>
             </a:fld>
             <a:endParaRPr lang="hu-HU"/>
           </a:p>
@@ -598,7 +609,7 @@
           <a:p>
             <a:fld id="{3501FAD6-AC86-4277-8AB6-0EB25B745D01}" type="datetimeFigureOut">
               <a:rPr lang="hu-HU" smtClean="0"/>
-              <a:t>2023.10.04.</a:t>
+              <a:t>2023.10.11.</a:t>
             </a:fld>
             <a:endParaRPr lang="hu-HU"/>
           </a:p>
@@ -768,7 +779,7 @@
           <a:p>
             <a:fld id="{3501FAD6-AC86-4277-8AB6-0EB25B745D01}" type="datetimeFigureOut">
               <a:rPr lang="hu-HU" smtClean="0"/>
-              <a:t>2023.10.04.</a:t>
+              <a:t>2023.10.11.</a:t>
             </a:fld>
             <a:endParaRPr lang="hu-HU"/>
           </a:p>
@@ -1014,7 +1025,7 @@
           <a:p>
             <a:fld id="{3501FAD6-AC86-4277-8AB6-0EB25B745D01}" type="datetimeFigureOut">
               <a:rPr lang="hu-HU" smtClean="0"/>
-              <a:t>2023.10.04.</a:t>
+              <a:t>2023.10.11.</a:t>
             </a:fld>
             <a:endParaRPr lang="hu-HU"/>
           </a:p>
@@ -1246,7 +1257,7 @@
           <a:p>
             <a:fld id="{3501FAD6-AC86-4277-8AB6-0EB25B745D01}" type="datetimeFigureOut">
               <a:rPr lang="hu-HU" smtClean="0"/>
-              <a:t>2023.10.04.</a:t>
+              <a:t>2023.10.11.</a:t>
             </a:fld>
             <a:endParaRPr lang="hu-HU"/>
           </a:p>
@@ -1613,7 +1624,7 @@
           <a:p>
             <a:fld id="{3501FAD6-AC86-4277-8AB6-0EB25B745D01}" type="datetimeFigureOut">
               <a:rPr lang="hu-HU" smtClean="0"/>
-              <a:t>2023.10.04.</a:t>
+              <a:t>2023.10.11.</a:t>
             </a:fld>
             <a:endParaRPr lang="hu-HU"/>
           </a:p>
@@ -1731,7 +1742,7 @@
           <a:p>
             <a:fld id="{3501FAD6-AC86-4277-8AB6-0EB25B745D01}" type="datetimeFigureOut">
               <a:rPr lang="hu-HU" smtClean="0"/>
-              <a:t>2023.10.04.</a:t>
+              <a:t>2023.10.11.</a:t>
             </a:fld>
             <a:endParaRPr lang="hu-HU"/>
           </a:p>
@@ -1826,7 +1837,7 @@
           <a:p>
             <a:fld id="{3501FAD6-AC86-4277-8AB6-0EB25B745D01}" type="datetimeFigureOut">
               <a:rPr lang="hu-HU" smtClean="0"/>
-              <a:t>2023.10.04.</a:t>
+              <a:t>2023.10.11.</a:t>
             </a:fld>
             <a:endParaRPr lang="hu-HU"/>
           </a:p>
@@ -2103,7 +2114,7 @@
           <a:p>
             <a:fld id="{3501FAD6-AC86-4277-8AB6-0EB25B745D01}" type="datetimeFigureOut">
               <a:rPr lang="hu-HU" smtClean="0"/>
-              <a:t>2023.10.04.</a:t>
+              <a:t>2023.10.11.</a:t>
             </a:fld>
             <a:endParaRPr lang="hu-HU"/>
           </a:p>
@@ -2356,7 +2367,7 @@
           <a:p>
             <a:fld id="{3501FAD6-AC86-4277-8AB6-0EB25B745D01}" type="datetimeFigureOut">
               <a:rPr lang="hu-HU" smtClean="0"/>
-              <a:t>2023.10.04.</a:t>
+              <a:t>2023.10.11.</a:t>
             </a:fld>
             <a:endParaRPr lang="hu-HU"/>
           </a:p>
@@ -2569,7 +2580,7 @@
           <a:p>
             <a:fld id="{3501FAD6-AC86-4277-8AB6-0EB25B745D01}" type="datetimeFigureOut">
               <a:rPr lang="hu-HU" smtClean="0"/>
-              <a:t>2023.10.04.</a:t>
+              <a:t>2023.10.11.</a:t>
             </a:fld>
             <a:endParaRPr lang="hu-HU"/>
           </a:p>
@@ -3101,7 +3112,7 @@
               <a:buNone/>
             </a:pPr>
             <a:r>
-              <a:rPr lang="hu-HU" sz="1600" b="1" dirty="0" err="1" smtClean="0"/>
+              <a:rPr lang="hu-HU" sz="1600" b="1" dirty="0" smtClean="0"/>
               <a:t>Adatfolyamozás</a:t>
             </a:r>
             <a:endParaRPr lang="hu-HU" sz="1600" b="1" dirty="0"/>
@@ -3112,7 +3123,7 @@
               <a:t>A DDR5 RAM támogatja az </a:t>
             </a:r>
             <a:r>
-              <a:rPr lang="hu-HU" sz="1600" b="1" dirty="0" err="1"/>
+              <a:rPr lang="hu-HU" sz="1600" b="1" dirty="0"/>
               <a:t>adatfolyamozást</a:t>
             </a:r>
             <a:r>
@@ -3135,19 +3146,7 @@
             </a:r>
             <a:r>
               <a:rPr lang="hu-HU" sz="1600" dirty="0"/>
-              <a:t>(</a:t>
-            </a:r>
-            <a:r>
-              <a:rPr lang="hu-HU" sz="1600" dirty="0" err="1"/>
-              <a:t>Error-Correcting</a:t>
-            </a:r>
-            <a:r>
-              <a:rPr lang="hu-HU" sz="1600" dirty="0"/>
-              <a:t> </a:t>
-            </a:r>
-            <a:r>
-              <a:rPr lang="hu-HU" sz="1600" dirty="0" err="1"/>
-              <a:t>Code</a:t>
+              <a:t>(Error-Correcting Code</a:t>
             </a:r>
             <a:r>
               <a:rPr lang="hu-HU" sz="1600" dirty="0" smtClean="0"/>
@@ -3158,15 +3157,23 @@
           <a:p>
             <a:r>
               <a:rPr lang="hu-HU" sz="1600" dirty="0"/>
-              <a:t>A DDR5 RAM-</a:t>
-            </a:r>
-            <a:r>
-              <a:rPr lang="hu-HU" sz="1600" dirty="0" err="1"/>
-              <a:t>ben</a:t>
+              <a:t>A DDR5 </a:t>
+            </a:r>
+            <a:r>
+              <a:rPr lang="hu-HU" sz="1600" dirty="0" smtClean="0"/>
+              <a:t>RAM-</a:t>
+            </a:r>
+            <a:r>
+              <a:rPr lang="hu-HU" sz="1600" dirty="0" err="1" smtClean="0"/>
+              <a:t>ban</a:t>
+            </a:r>
+            <a:r>
+              <a:rPr lang="hu-HU" sz="1600" dirty="0" smtClean="0"/>
+              <a:t> </a:t>
             </a:r>
             <a:r>
               <a:rPr lang="hu-HU" sz="1600" dirty="0"/>
-              <a:t> javított ECC funkciók érhetők el, amelyek hibajavítást és megbízhatóságot nyújtanak. Ez segít csökkenteni az adatvesztés és a hibás működés kockázatát</a:t>
+              <a:t>javított ECC funkciók érhetők el, amelyek hibajavítást és megbízhatóságot nyújtanak. Ez segít csökkenteni az adatvesztés és a hibás működés kockázatát</a:t>
             </a:r>
             <a:r>
               <a:rPr lang="hu-HU" sz="1600" dirty="0" smtClean="0"/>
@@ -3246,6 +3253,807 @@
 </file>
 
 <file path=ppt/slides/slide11.xml><?xml version="1.0" encoding="utf-8"?>
+<p:sld xmlns:a="http://schemas.openxmlformats.org/drawingml/2006/main" xmlns:r="http://schemas.openxmlformats.org/officeDocument/2006/relationships" xmlns:p="http://schemas.openxmlformats.org/presentationml/2006/main">
+  <p:cSld>
+    <p:spTree>
+      <p:nvGrpSpPr>
+        <p:cNvPr id="1" name=""/>
+        <p:cNvGrpSpPr/>
+        <p:nvPr/>
+      </p:nvGrpSpPr>
+      <p:grpSpPr>
+        <a:xfrm>
+          <a:off x="0" y="0"/>
+          <a:ext cx="0" cy="0"/>
+          <a:chOff x="0" y="0"/>
+          <a:chExt cx="0" cy="0"/>
+        </a:xfrm>
+      </p:grpSpPr>
+      <p:sp>
+        <p:nvSpPr>
+          <p:cNvPr id="2" name="Cím 1"/>
+          <p:cNvSpPr>
+            <a:spLocks noGrp="1"/>
+          </p:cNvSpPr>
+          <p:nvPr>
+            <p:ph type="title"/>
+          </p:nvPr>
+        </p:nvSpPr>
+        <p:spPr/>
+        <p:txBody>
+          <a:bodyPr/>
+          <a:lstStyle/>
+          <a:p>
+            <a:r>
+              <a:rPr lang="hu-HU" dirty="0" smtClean="0"/>
+              <a:t>Processzor</a:t>
+            </a:r>
+            <a:endParaRPr lang="hu-HU" dirty="0"/>
+          </a:p>
+        </p:txBody>
+      </p:sp>
+      <p:sp>
+        <p:nvSpPr>
+          <p:cNvPr id="3" name="Tartalom helye 2"/>
+          <p:cNvSpPr>
+            <a:spLocks noGrp="1"/>
+          </p:cNvSpPr>
+          <p:nvPr>
+            <p:ph idx="1"/>
+          </p:nvPr>
+        </p:nvSpPr>
+        <p:spPr/>
+        <p:txBody>
+          <a:bodyPr>
+            <a:normAutofit/>
+          </a:bodyPr>
+          <a:lstStyle/>
+          <a:p>
+            <a:r>
+              <a:rPr lang="hu-HU" sz="2400" dirty="0"/>
+              <a:t>a számítógép „agya”, azon egysége, mely az utasítások értelmezését és végrehajtását </a:t>
+            </a:r>
+            <a:r>
+              <a:rPr lang="hu-HU" sz="2400" dirty="0" smtClean="0"/>
+              <a:t>vezérli.</a:t>
+            </a:r>
+          </a:p>
+          <a:p>
+            <a:r>
+              <a:rPr lang="hu-HU" sz="2400" dirty="0"/>
+              <a:t>Félvezetős </a:t>
+            </a:r>
+            <a:r>
+              <a:rPr lang="hu-HU" sz="2400" dirty="0" smtClean="0"/>
+              <a:t>kivitelezésű</a:t>
+            </a:r>
+            <a:r>
+              <a:rPr lang="hu-HU" sz="2400" dirty="0"/>
+              <a:t>, összetett elektronikus </a:t>
+            </a:r>
+            <a:r>
+              <a:rPr lang="hu-HU" sz="2400" dirty="0" smtClean="0"/>
+              <a:t>áramkör.</a:t>
+            </a:r>
+            <a:endParaRPr lang="hu-HU" sz="2400" dirty="0"/>
+          </a:p>
+        </p:txBody>
+      </p:sp>
+      <p:pic>
+        <p:nvPicPr>
+          <p:cNvPr id="4" name="Kép 3"/>
+          <p:cNvPicPr>
+            <a:picLocks noChangeAspect="1"/>
+          </p:cNvPicPr>
+          <p:nvPr/>
+        </p:nvPicPr>
+        <p:blipFill>
+          <a:blip r:embed="rId2"/>
+          <a:stretch>
+            <a:fillRect/>
+          </a:stretch>
+        </p:blipFill>
+        <p:spPr>
+          <a:xfrm>
+            <a:off x="8463643" y="3833812"/>
+            <a:ext cx="2362200" cy="1933575"/>
+          </a:xfrm>
+          <a:prstGeom prst="rect">
+            <a:avLst/>
+          </a:prstGeom>
+        </p:spPr>
+      </p:pic>
+    </p:spTree>
+    <p:extLst>
+      <p:ext uri="{BB962C8B-B14F-4D97-AF65-F5344CB8AC3E}">
+        <p14:creationId xmlns:p14="http://schemas.microsoft.com/office/powerpoint/2010/main" val="2866108122"/>
+      </p:ext>
+    </p:extLst>
+  </p:cSld>
+  <p:clrMapOvr>
+    <a:masterClrMapping/>
+  </p:clrMapOvr>
+</p:sld>
+</file>
+
+<file path=ppt/slides/slide12.xml><?xml version="1.0" encoding="utf-8"?>
+<p:sld xmlns:a="http://schemas.openxmlformats.org/drawingml/2006/main" xmlns:r="http://schemas.openxmlformats.org/officeDocument/2006/relationships" xmlns:p="http://schemas.openxmlformats.org/presentationml/2006/main">
+  <p:cSld>
+    <p:spTree>
+      <p:nvGrpSpPr>
+        <p:cNvPr id="1" name=""/>
+        <p:cNvGrpSpPr/>
+        <p:nvPr/>
+      </p:nvGrpSpPr>
+      <p:grpSpPr>
+        <a:xfrm>
+          <a:off x="0" y="0"/>
+          <a:ext cx="0" cy="0"/>
+          <a:chOff x="0" y="0"/>
+          <a:chExt cx="0" cy="0"/>
+        </a:xfrm>
+      </p:grpSpPr>
+      <p:sp>
+        <p:nvSpPr>
+          <p:cNvPr id="2" name="Cím 1"/>
+          <p:cNvSpPr>
+            <a:spLocks noGrp="1"/>
+          </p:cNvSpPr>
+          <p:nvPr>
+            <p:ph type="title"/>
+          </p:nvPr>
+        </p:nvSpPr>
+        <p:spPr/>
+        <p:txBody>
+          <a:bodyPr/>
+          <a:lstStyle/>
+          <a:p>
+            <a:r>
+              <a:rPr lang="hu-HU" dirty="0" smtClean="0"/>
+              <a:t>Története</a:t>
+            </a:r>
+            <a:endParaRPr lang="hu-HU" dirty="0"/>
+          </a:p>
+        </p:txBody>
+      </p:sp>
+      <p:sp>
+        <p:nvSpPr>
+          <p:cNvPr id="3" name="Tartalom helye 2"/>
+          <p:cNvSpPr>
+            <a:spLocks noGrp="1"/>
+          </p:cNvSpPr>
+          <p:nvPr>
+            <p:ph idx="1"/>
+          </p:nvPr>
+        </p:nvSpPr>
+        <p:spPr>
+          <a:xfrm>
+            <a:off x="6008915" y="2329541"/>
+            <a:ext cx="5170714" cy="4191455"/>
+          </a:xfrm>
+        </p:spPr>
+        <p:txBody>
+          <a:bodyPr/>
+          <a:lstStyle/>
+          <a:p>
+            <a:r>
+              <a:rPr lang="hu-HU" dirty="0"/>
+              <a:t>Az első mikroprocesszor </a:t>
+            </a:r>
+            <a:r>
+              <a:rPr lang="hu-HU" dirty="0" smtClean="0"/>
+              <a:t>a 4 bites Intel 4004 volt (</a:t>
+            </a:r>
+            <a:r>
+              <a:rPr lang="hu-HU" sz="2400" i="1" dirty="0" smtClean="0"/>
+              <a:t>1974</a:t>
+            </a:r>
+            <a:r>
+              <a:rPr lang="hu-HU" dirty="0" smtClean="0"/>
+              <a:t>) </a:t>
+            </a:r>
+          </a:p>
+          <a:p>
+            <a:pPr marL="0" indent="0">
+              <a:buNone/>
+            </a:pPr>
+            <a:endParaRPr lang="hu-HU" dirty="0" smtClean="0"/>
+          </a:p>
+          <a:p>
+            <a:r>
+              <a:rPr lang="hu-HU" dirty="0" smtClean="0"/>
+              <a:t>Később több sikeres 8 bites sorozat. (</a:t>
+            </a:r>
+            <a:r>
+              <a:rPr lang="hu-HU" sz="2400" i="1" dirty="0" smtClean="0"/>
+              <a:t>Intel 8008, Zilog Z80, Motorola 6800</a:t>
+            </a:r>
+            <a:r>
+              <a:rPr lang="hu-HU" dirty="0" smtClean="0"/>
+              <a:t>)</a:t>
+            </a:r>
+          </a:p>
+          <a:p>
+            <a:pPr marL="0" indent="0">
+              <a:buNone/>
+            </a:pPr>
+            <a:endParaRPr lang="hu-HU" dirty="0"/>
+          </a:p>
+        </p:txBody>
+      </p:sp>
+      <p:pic>
+        <p:nvPicPr>
+          <p:cNvPr id="4" name="Kép 3"/>
+          <p:cNvPicPr>
+            <a:picLocks noChangeAspect="1"/>
+          </p:cNvPicPr>
+          <p:nvPr/>
+        </p:nvPicPr>
+        <p:blipFill>
+          <a:blip r:embed="rId2"/>
+          <a:stretch>
+            <a:fillRect/>
+          </a:stretch>
+        </p:blipFill>
+        <p:spPr>
+          <a:xfrm>
+            <a:off x="0" y="3404949"/>
+            <a:ext cx="5181600" cy="3453051"/>
+          </a:xfrm>
+          <a:prstGeom prst="rect">
+            <a:avLst/>
+          </a:prstGeom>
+        </p:spPr>
+      </p:pic>
+    </p:spTree>
+    <p:extLst>
+      <p:ext uri="{BB962C8B-B14F-4D97-AF65-F5344CB8AC3E}">
+        <p14:creationId xmlns:p14="http://schemas.microsoft.com/office/powerpoint/2010/main" val="4004960347"/>
+      </p:ext>
+    </p:extLst>
+  </p:cSld>
+  <p:clrMapOvr>
+    <a:masterClrMapping/>
+  </p:clrMapOvr>
+</p:sld>
+</file>
+
+<file path=ppt/slides/slide13.xml><?xml version="1.0" encoding="utf-8"?>
+<p:sld xmlns:a="http://schemas.openxmlformats.org/drawingml/2006/main" xmlns:r="http://schemas.openxmlformats.org/officeDocument/2006/relationships" xmlns:p="http://schemas.openxmlformats.org/presentationml/2006/main">
+  <p:cSld>
+    <p:spTree>
+      <p:nvGrpSpPr>
+        <p:cNvPr id="1" name=""/>
+        <p:cNvGrpSpPr/>
+        <p:nvPr/>
+      </p:nvGrpSpPr>
+      <p:grpSpPr>
+        <a:xfrm>
+          <a:off x="0" y="0"/>
+          <a:ext cx="0" cy="0"/>
+          <a:chOff x="0" y="0"/>
+          <a:chExt cx="0" cy="0"/>
+        </a:xfrm>
+      </p:grpSpPr>
+      <p:sp>
+        <p:nvSpPr>
+          <p:cNvPr id="2" name="Cím 1"/>
+          <p:cNvSpPr>
+            <a:spLocks noGrp="1"/>
+          </p:cNvSpPr>
+          <p:nvPr>
+            <p:ph type="title"/>
+          </p:nvPr>
+        </p:nvSpPr>
+        <p:spPr/>
+        <p:txBody>
+          <a:bodyPr/>
+          <a:lstStyle/>
+          <a:p>
+            <a:r>
+              <a:rPr lang="hu-HU" dirty="0"/>
+              <a:t>A processzor főbb </a:t>
+            </a:r>
+            <a:r>
+              <a:rPr lang="hu-HU" dirty="0" smtClean="0"/>
+              <a:t>részei</a:t>
+            </a:r>
+            <a:endParaRPr lang="hu-HU" dirty="0"/>
+          </a:p>
+        </p:txBody>
+      </p:sp>
+      <p:sp>
+        <p:nvSpPr>
+          <p:cNvPr id="3" name="Tartalom helye 2"/>
+          <p:cNvSpPr>
+            <a:spLocks noGrp="1"/>
+          </p:cNvSpPr>
+          <p:nvPr>
+            <p:ph idx="1"/>
+          </p:nvPr>
+        </p:nvSpPr>
+        <p:spPr/>
+        <p:txBody>
+          <a:bodyPr>
+            <a:normAutofit/>
+          </a:bodyPr>
+          <a:lstStyle/>
+          <a:p>
+            <a:pPr marL="0" indent="0">
+              <a:buNone/>
+            </a:pPr>
+            <a:r>
+              <a:rPr lang="hu-HU" b="1" dirty="0"/>
+              <a:t>ALU</a:t>
+            </a:r>
+            <a:r>
+              <a:rPr lang="hu-HU" dirty="0"/>
+              <a:t> (</a:t>
+            </a:r>
+            <a:r>
+              <a:rPr lang="hu-HU" dirty="0" err="1"/>
+              <a:t>Arithmetic</a:t>
+            </a:r>
+            <a:r>
+              <a:rPr lang="hu-HU" dirty="0"/>
+              <a:t> </a:t>
+            </a:r>
+            <a:r>
+              <a:rPr lang="hu-HU" dirty="0" smtClean="0"/>
+              <a:t>and </a:t>
+            </a:r>
+            <a:r>
+              <a:rPr lang="hu-HU" dirty="0" err="1"/>
+              <a:t>Logical</a:t>
+            </a:r>
+            <a:r>
+              <a:rPr lang="hu-HU" dirty="0"/>
+              <a:t> Unit - Aritmetikai és Logikai Egység</a:t>
+            </a:r>
+            <a:r>
+              <a:rPr lang="hu-HU" dirty="0" smtClean="0"/>
+              <a:t>):</a:t>
+            </a:r>
+          </a:p>
+          <a:p>
+            <a:r>
+              <a:rPr lang="hu-HU" sz="2400" dirty="0"/>
+              <a:t>a</a:t>
+            </a:r>
+            <a:r>
+              <a:rPr lang="hu-HU" sz="2400" dirty="0" smtClean="0"/>
+              <a:t> </a:t>
+            </a:r>
+            <a:r>
+              <a:rPr lang="hu-HU" sz="2400" dirty="0"/>
+              <a:t>processzor alapvető </a:t>
+            </a:r>
+            <a:r>
+              <a:rPr lang="hu-HU" sz="2400" dirty="0" smtClean="0"/>
+              <a:t>alkotórésze</a:t>
+            </a:r>
+          </a:p>
+          <a:p>
+            <a:r>
+              <a:rPr lang="hu-HU" sz="2400" dirty="0"/>
+              <a:t>alapvető matematikai és logikai műveleteket hajt </a:t>
+            </a:r>
+            <a:r>
+              <a:rPr lang="hu-HU" sz="2400" dirty="0" smtClean="0"/>
+              <a:t>végre</a:t>
+            </a:r>
+          </a:p>
+          <a:p>
+            <a:endParaRPr lang="hu-HU" dirty="0" smtClean="0"/>
+          </a:p>
+          <a:p>
+            <a:pPr marL="0" indent="0">
+              <a:buNone/>
+            </a:pPr>
+            <a:r>
+              <a:rPr lang="hu-HU" b="1" dirty="0"/>
+              <a:t>AGU </a:t>
+            </a:r>
+            <a:r>
+              <a:rPr lang="hu-HU" dirty="0"/>
+              <a:t>(</a:t>
+            </a:r>
+            <a:r>
+              <a:rPr lang="hu-HU" dirty="0" err="1"/>
+              <a:t>Address</a:t>
+            </a:r>
+            <a:r>
+              <a:rPr lang="hu-HU" dirty="0"/>
+              <a:t> </a:t>
+            </a:r>
+            <a:r>
+              <a:rPr lang="hu-HU" dirty="0" err="1"/>
+              <a:t>Generation</a:t>
+            </a:r>
+            <a:r>
+              <a:rPr lang="hu-HU" dirty="0"/>
+              <a:t> Unit): </a:t>
+            </a:r>
+            <a:endParaRPr lang="hu-HU" dirty="0" smtClean="0"/>
+          </a:p>
+          <a:p>
+            <a:r>
+              <a:rPr lang="hu-HU" sz="2400" dirty="0"/>
+              <a:t>a</a:t>
+            </a:r>
+            <a:r>
+              <a:rPr lang="hu-HU" sz="2400" dirty="0" smtClean="0"/>
+              <a:t> </a:t>
+            </a:r>
+            <a:r>
+              <a:rPr lang="hu-HU" sz="2400" dirty="0"/>
+              <a:t>címszámító </a:t>
+            </a:r>
+            <a:r>
+              <a:rPr lang="hu-HU" sz="2400" dirty="0" smtClean="0"/>
+              <a:t>egység</a:t>
+            </a:r>
+          </a:p>
+          <a:p>
+            <a:r>
+              <a:rPr lang="hu-HU" sz="2400" dirty="0" smtClean="0"/>
+              <a:t>címek </a:t>
+            </a:r>
+            <a:r>
+              <a:rPr lang="hu-HU" sz="2400" dirty="0" err="1"/>
+              <a:t>leképezése</a:t>
+            </a:r>
+            <a:r>
+              <a:rPr lang="hu-HU" sz="2400" dirty="0"/>
+              <a:t> a </a:t>
+            </a:r>
+            <a:r>
+              <a:rPr lang="hu-HU" sz="2400" dirty="0" err="1"/>
+              <a:t>főtár</a:t>
+            </a:r>
+            <a:r>
+              <a:rPr lang="hu-HU" sz="2400" dirty="0"/>
+              <a:t> fizikai címeire és a tároló védelmi hibák </a:t>
+            </a:r>
+            <a:r>
+              <a:rPr lang="hu-HU" sz="2400" dirty="0" smtClean="0"/>
+              <a:t>felismerése</a:t>
+            </a:r>
+            <a:endParaRPr lang="hu-HU" sz="2400" dirty="0"/>
+          </a:p>
+          <a:p>
+            <a:pPr marL="0" indent="0">
+              <a:buNone/>
+            </a:pPr>
+            <a:endParaRPr lang="hu-HU" dirty="0"/>
+          </a:p>
+        </p:txBody>
+      </p:sp>
+    </p:spTree>
+    <p:extLst>
+      <p:ext uri="{BB962C8B-B14F-4D97-AF65-F5344CB8AC3E}">
+        <p14:creationId xmlns:p14="http://schemas.microsoft.com/office/powerpoint/2010/main" val="3115901939"/>
+      </p:ext>
+    </p:extLst>
+  </p:cSld>
+  <p:clrMapOvr>
+    <a:masterClrMapping/>
+  </p:clrMapOvr>
+</p:sld>
+</file>
+
+<file path=ppt/slides/slide14.xml><?xml version="1.0" encoding="utf-8"?>
+<p:sld xmlns:a="http://schemas.openxmlformats.org/drawingml/2006/main" xmlns:r="http://schemas.openxmlformats.org/officeDocument/2006/relationships" xmlns:p="http://schemas.openxmlformats.org/presentationml/2006/main">
+  <p:cSld>
+    <p:spTree>
+      <p:nvGrpSpPr>
+        <p:cNvPr id="1" name=""/>
+        <p:cNvGrpSpPr/>
+        <p:nvPr/>
+      </p:nvGrpSpPr>
+      <p:grpSpPr>
+        <a:xfrm>
+          <a:off x="0" y="0"/>
+          <a:ext cx="0" cy="0"/>
+          <a:chOff x="0" y="0"/>
+          <a:chExt cx="0" cy="0"/>
+        </a:xfrm>
+      </p:grpSpPr>
+      <p:sp>
+        <p:nvSpPr>
+          <p:cNvPr id="2" name="Cím 1"/>
+          <p:cNvSpPr>
+            <a:spLocks noGrp="1"/>
+          </p:cNvSpPr>
+          <p:nvPr>
+            <p:ph type="title"/>
+          </p:nvPr>
+        </p:nvSpPr>
+        <p:spPr/>
+        <p:txBody>
+          <a:bodyPr/>
+          <a:lstStyle/>
+          <a:p>
+            <a:r>
+              <a:rPr lang="hu-HU" dirty="0"/>
+              <a:t>A processzor főbb részei</a:t>
+            </a:r>
+          </a:p>
+        </p:txBody>
+      </p:sp>
+      <p:sp>
+        <p:nvSpPr>
+          <p:cNvPr id="3" name="Tartalom helye 2"/>
+          <p:cNvSpPr>
+            <a:spLocks noGrp="1"/>
+          </p:cNvSpPr>
+          <p:nvPr>
+            <p:ph idx="1"/>
+          </p:nvPr>
+        </p:nvSpPr>
+        <p:spPr/>
+        <p:txBody>
+          <a:bodyPr/>
+          <a:lstStyle/>
+          <a:p>
+            <a:pPr marL="0" lvl="0" indent="0">
+              <a:buNone/>
+            </a:pPr>
+            <a:r>
+              <a:rPr lang="hu-HU" b="1" dirty="0"/>
+              <a:t>CU</a:t>
+            </a:r>
+            <a:r>
+              <a:rPr lang="hu-HU" dirty="0"/>
+              <a:t> (</a:t>
+            </a:r>
+            <a:r>
+              <a:rPr lang="hu-HU" dirty="0" err="1"/>
+              <a:t>Control</a:t>
+            </a:r>
+            <a:r>
+              <a:rPr lang="hu-HU" dirty="0"/>
+              <a:t> Unit - Vezérlőegység vagy Vezérlőáramkör): </a:t>
+            </a:r>
+            <a:endParaRPr lang="hu-HU" dirty="0" smtClean="0"/>
+          </a:p>
+          <a:p>
+            <a:pPr lvl="0"/>
+            <a:r>
+              <a:rPr lang="hu-HU" dirty="0"/>
+              <a:t>e</a:t>
+            </a:r>
+            <a:r>
+              <a:rPr lang="hu-HU" dirty="0" smtClean="0"/>
+              <a:t>z </a:t>
+            </a:r>
+            <a:r>
+              <a:rPr lang="hu-HU" dirty="0"/>
+              <a:t>szervezi, ütemezi a processzor egész </a:t>
+            </a:r>
+            <a:r>
+              <a:rPr lang="hu-HU" dirty="0" smtClean="0"/>
+              <a:t>munkáját</a:t>
+            </a:r>
+          </a:p>
+          <a:p>
+            <a:pPr lvl="0"/>
+            <a:r>
+              <a:rPr lang="hu-HU" dirty="0" smtClean="0"/>
+              <a:t>lehívja </a:t>
+            </a:r>
+            <a:r>
+              <a:rPr lang="hu-HU" dirty="0"/>
+              <a:t>a memóriából a soron következő utasítást, értelmezi és </a:t>
+            </a:r>
+            <a:r>
+              <a:rPr lang="hu-HU" dirty="0" err="1"/>
+              <a:t>végrehajtatja</a:t>
+            </a:r>
+            <a:r>
+              <a:rPr lang="hu-HU" dirty="0"/>
+              <a:t> azt, majd meghatározza a következő utasítás </a:t>
+            </a:r>
+            <a:r>
+              <a:rPr lang="hu-HU" dirty="0" smtClean="0"/>
+              <a:t>címét</a:t>
+            </a:r>
+          </a:p>
+          <a:p>
+            <a:pPr marL="0" lvl="0" indent="0">
+              <a:buNone/>
+            </a:pPr>
+            <a:endParaRPr lang="hu-HU" dirty="0"/>
+          </a:p>
+          <a:p>
+            <a:pPr marL="0" lvl="0" indent="0">
+              <a:buNone/>
+            </a:pPr>
+            <a:r>
+              <a:rPr lang="hu-HU" b="1" dirty="0"/>
+              <a:t>Regiszter </a:t>
+            </a:r>
+            <a:r>
+              <a:rPr lang="hu-HU" dirty="0"/>
+              <a:t>(</a:t>
+            </a:r>
+            <a:r>
+              <a:rPr lang="hu-HU" dirty="0" err="1"/>
+              <a:t>Register</a:t>
+            </a:r>
+            <a:r>
+              <a:rPr lang="hu-HU" dirty="0" smtClean="0"/>
+              <a:t>):</a:t>
+            </a:r>
+          </a:p>
+          <a:p>
+            <a:pPr lvl="0"/>
+            <a:r>
+              <a:rPr lang="hu-HU" dirty="0" smtClean="0"/>
+              <a:t>A </a:t>
+            </a:r>
+            <a:r>
+              <a:rPr lang="hu-HU" dirty="0"/>
+              <a:t>regiszter a processzorba beépített nagyon gyors elérésű, kis méretű memória</a:t>
+            </a:r>
+            <a:r>
+              <a:rPr lang="hu-HU"/>
+              <a:t>. </a:t>
+            </a:r>
+            <a:endParaRPr lang="hu-HU" dirty="0"/>
+          </a:p>
+        </p:txBody>
+      </p:sp>
+    </p:spTree>
+    <p:extLst>
+      <p:ext uri="{BB962C8B-B14F-4D97-AF65-F5344CB8AC3E}">
+        <p14:creationId xmlns:p14="http://schemas.microsoft.com/office/powerpoint/2010/main" val="4091424038"/>
+      </p:ext>
+    </p:extLst>
+  </p:cSld>
+  <p:clrMapOvr>
+    <a:masterClrMapping/>
+  </p:clrMapOvr>
+</p:sld>
+</file>
+
+<file path=ppt/slides/slide15.xml><?xml version="1.0" encoding="utf-8"?>
+<p:sld xmlns:a="http://schemas.openxmlformats.org/drawingml/2006/main" xmlns:r="http://schemas.openxmlformats.org/officeDocument/2006/relationships" xmlns:p="http://schemas.openxmlformats.org/presentationml/2006/main">
+  <p:cSld>
+    <p:spTree>
+      <p:nvGrpSpPr>
+        <p:cNvPr id="1" name=""/>
+        <p:cNvGrpSpPr/>
+        <p:nvPr/>
+      </p:nvGrpSpPr>
+      <p:grpSpPr>
+        <a:xfrm>
+          <a:off x="0" y="0"/>
+          <a:ext cx="0" cy="0"/>
+          <a:chOff x="0" y="0"/>
+          <a:chExt cx="0" cy="0"/>
+        </a:xfrm>
+      </p:grpSpPr>
+      <p:sp>
+        <p:nvSpPr>
+          <p:cNvPr id="2" name="Cím 1"/>
+          <p:cNvSpPr>
+            <a:spLocks noGrp="1"/>
+          </p:cNvSpPr>
+          <p:nvPr>
+            <p:ph type="title"/>
+          </p:nvPr>
+        </p:nvSpPr>
+        <p:spPr/>
+        <p:txBody>
+          <a:bodyPr/>
+          <a:lstStyle/>
+          <a:p>
+            <a:endParaRPr lang="hu-HU"/>
+          </a:p>
+        </p:txBody>
+      </p:sp>
+      <p:sp>
+        <p:nvSpPr>
+          <p:cNvPr id="3" name="Tartalom helye 2"/>
+          <p:cNvSpPr>
+            <a:spLocks noGrp="1"/>
+          </p:cNvSpPr>
+          <p:nvPr>
+            <p:ph idx="1"/>
+          </p:nvPr>
+        </p:nvSpPr>
+        <p:spPr/>
+        <p:txBody>
+          <a:bodyPr/>
+          <a:lstStyle/>
+          <a:p>
+            <a:endParaRPr lang="hu-HU"/>
+          </a:p>
+        </p:txBody>
+      </p:sp>
+    </p:spTree>
+    <p:extLst>
+      <p:ext uri="{BB962C8B-B14F-4D97-AF65-F5344CB8AC3E}">
+        <p14:creationId xmlns:p14="http://schemas.microsoft.com/office/powerpoint/2010/main" val="3982985037"/>
+      </p:ext>
+    </p:extLst>
+  </p:cSld>
+  <p:clrMapOvr>
+    <a:masterClrMapping/>
+  </p:clrMapOvr>
+</p:sld>
+</file>
+
+<file path=ppt/slides/slide16.xml><?xml version="1.0" encoding="utf-8"?>
+<p:sld xmlns:a="http://schemas.openxmlformats.org/drawingml/2006/main" xmlns:r="http://schemas.openxmlformats.org/officeDocument/2006/relationships" xmlns:p="http://schemas.openxmlformats.org/presentationml/2006/main">
+  <p:cSld>
+    <p:spTree>
+      <p:nvGrpSpPr>
+        <p:cNvPr id="1" name=""/>
+        <p:cNvGrpSpPr/>
+        <p:nvPr/>
+      </p:nvGrpSpPr>
+      <p:grpSpPr>
+        <a:xfrm>
+          <a:off x="0" y="0"/>
+          <a:ext cx="0" cy="0"/>
+          <a:chOff x="0" y="0"/>
+          <a:chExt cx="0" cy="0"/>
+        </a:xfrm>
+      </p:grpSpPr>
+      <p:sp>
+        <p:nvSpPr>
+          <p:cNvPr id="2" name="Cím 1"/>
+          <p:cNvSpPr>
+            <a:spLocks noGrp="1"/>
+          </p:cNvSpPr>
+          <p:nvPr>
+            <p:ph type="title"/>
+          </p:nvPr>
+        </p:nvSpPr>
+        <p:spPr/>
+        <p:txBody>
+          <a:bodyPr/>
+          <a:lstStyle/>
+          <a:p>
+            <a:endParaRPr lang="hu-HU"/>
+          </a:p>
+        </p:txBody>
+      </p:sp>
+      <p:sp>
+        <p:nvSpPr>
+          <p:cNvPr id="3" name="Tartalom helye 2"/>
+          <p:cNvSpPr>
+            <a:spLocks noGrp="1"/>
+          </p:cNvSpPr>
+          <p:nvPr>
+            <p:ph idx="1"/>
+          </p:nvPr>
+        </p:nvSpPr>
+        <p:spPr/>
+        <p:txBody>
+          <a:bodyPr/>
+          <a:lstStyle/>
+          <a:p>
+            <a:endParaRPr lang="hu-HU"/>
+          </a:p>
+        </p:txBody>
+      </p:sp>
+    </p:spTree>
+    <p:extLst>
+      <p:ext uri="{BB962C8B-B14F-4D97-AF65-F5344CB8AC3E}">
+        <p14:creationId xmlns:p14="http://schemas.microsoft.com/office/powerpoint/2010/main" val="1052172401"/>
+      </p:ext>
+    </p:extLst>
+  </p:cSld>
+  <p:clrMapOvr>
+    <a:masterClrMapping/>
+  </p:clrMapOvr>
+</p:sld>
+</file>
+
+<file path=ppt/slides/slide17.xml><?xml version="1.0" encoding="utf-8"?>
 <p:sld xmlns:a="http://schemas.openxmlformats.org/drawingml/2006/main" xmlns:r="http://schemas.openxmlformats.org/officeDocument/2006/relationships" xmlns:p="http://schemas.openxmlformats.org/presentationml/2006/main">
   <p:cSld>
     <p:spTree>
@@ -3752,15 +4560,7 @@
             </a:pPr>
             <a:r>
               <a:rPr lang="hu-HU" sz="2400" dirty="0" smtClean="0"/>
-              <a:t>2000 körül lett kifejlesztve a dupla adatsebesség véletlen </a:t>
-            </a:r>
-            <a:r>
-              <a:rPr lang="hu-HU" sz="2400" dirty="0" err="1" smtClean="0"/>
-              <a:t>hozzáférésű</a:t>
-            </a:r>
-            <a:r>
-              <a:rPr lang="hu-HU" sz="2400" dirty="0" smtClean="0"/>
-              <a:t> memória (DDR RAM). </a:t>
+              <a:t>2000 körül lett kifejlesztve a dupla adatsebesség véletlen hozzáférésű memória (DDR RAM). </a:t>
             </a:r>
           </a:p>
           <a:p>

</xml_diff>

<commit_message>
gddr ramok beillesztése a puritán ppt-be
</commit_message>
<xml_diff>
--- a/Puritánppt.pptx
+++ b/Puritánppt.pptx
@@ -15,14 +15,16 @@
     <p:sldId id="263" r:id="rId9"/>
     <p:sldId id="264" r:id="rId10"/>
     <p:sldId id="265" r:id="rId11"/>
-    <p:sldId id="267" r:id="rId12"/>
-    <p:sldId id="268" r:id="rId13"/>
-    <p:sldId id="269" r:id="rId14"/>
-    <p:sldId id="270" r:id="rId15"/>
-    <p:sldId id="271" r:id="rId16"/>
-    <p:sldId id="272" r:id="rId17"/>
-    <p:sldId id="273" r:id="rId18"/>
-    <p:sldId id="266" r:id="rId19"/>
+    <p:sldId id="274" r:id="rId12"/>
+    <p:sldId id="275" r:id="rId13"/>
+    <p:sldId id="267" r:id="rId14"/>
+    <p:sldId id="268" r:id="rId15"/>
+    <p:sldId id="269" r:id="rId16"/>
+    <p:sldId id="270" r:id="rId17"/>
+    <p:sldId id="271" r:id="rId18"/>
+    <p:sldId id="272" r:id="rId19"/>
+    <p:sldId id="273" r:id="rId20"/>
+    <p:sldId id="266" r:id="rId21"/>
   </p:sldIdLst>
   <p:sldSz cx="12192000" cy="6858000"/>
   <p:notesSz cx="6858000" cy="9144000"/>
@@ -260,7 +262,7 @@
           <a:p>
             <a:fld id="{3501FAD6-AC86-4277-8AB6-0EB25B745D01}" type="datetimeFigureOut">
               <a:rPr lang="hu-HU" smtClean="0"/>
-              <a:t>2023.10.25.</a:t>
+              <a:t>2023.11.14.</a:t>
             </a:fld>
             <a:endParaRPr lang="hu-HU"/>
           </a:p>
@@ -430,7 +432,7 @@
           <a:p>
             <a:fld id="{3501FAD6-AC86-4277-8AB6-0EB25B745D01}" type="datetimeFigureOut">
               <a:rPr lang="hu-HU" smtClean="0"/>
-              <a:t>2023.10.25.</a:t>
+              <a:t>2023.11.14.</a:t>
             </a:fld>
             <a:endParaRPr lang="hu-HU"/>
           </a:p>
@@ -610,7 +612,7 @@
           <a:p>
             <a:fld id="{3501FAD6-AC86-4277-8AB6-0EB25B745D01}" type="datetimeFigureOut">
               <a:rPr lang="hu-HU" smtClean="0"/>
-              <a:t>2023.10.25.</a:t>
+              <a:t>2023.11.14.</a:t>
             </a:fld>
             <a:endParaRPr lang="hu-HU"/>
           </a:p>
@@ -780,7 +782,7 @@
           <a:p>
             <a:fld id="{3501FAD6-AC86-4277-8AB6-0EB25B745D01}" type="datetimeFigureOut">
               <a:rPr lang="hu-HU" smtClean="0"/>
-              <a:t>2023.10.25.</a:t>
+              <a:t>2023.11.14.</a:t>
             </a:fld>
             <a:endParaRPr lang="hu-HU"/>
           </a:p>
@@ -1026,7 +1028,7 @@
           <a:p>
             <a:fld id="{3501FAD6-AC86-4277-8AB6-0EB25B745D01}" type="datetimeFigureOut">
               <a:rPr lang="hu-HU" smtClean="0"/>
-              <a:t>2023.10.25.</a:t>
+              <a:t>2023.11.14.</a:t>
             </a:fld>
             <a:endParaRPr lang="hu-HU"/>
           </a:p>
@@ -1258,7 +1260,7 @@
           <a:p>
             <a:fld id="{3501FAD6-AC86-4277-8AB6-0EB25B745D01}" type="datetimeFigureOut">
               <a:rPr lang="hu-HU" smtClean="0"/>
-              <a:t>2023.10.25.</a:t>
+              <a:t>2023.11.14.</a:t>
             </a:fld>
             <a:endParaRPr lang="hu-HU"/>
           </a:p>
@@ -1625,7 +1627,7 @@
           <a:p>
             <a:fld id="{3501FAD6-AC86-4277-8AB6-0EB25B745D01}" type="datetimeFigureOut">
               <a:rPr lang="hu-HU" smtClean="0"/>
-              <a:t>2023.10.25.</a:t>
+              <a:t>2023.11.14.</a:t>
             </a:fld>
             <a:endParaRPr lang="hu-HU"/>
           </a:p>
@@ -1743,7 +1745,7 @@
           <a:p>
             <a:fld id="{3501FAD6-AC86-4277-8AB6-0EB25B745D01}" type="datetimeFigureOut">
               <a:rPr lang="hu-HU" smtClean="0"/>
-              <a:t>2023.10.25.</a:t>
+              <a:t>2023.11.14.</a:t>
             </a:fld>
             <a:endParaRPr lang="hu-HU"/>
           </a:p>
@@ -1838,7 +1840,7 @@
           <a:p>
             <a:fld id="{3501FAD6-AC86-4277-8AB6-0EB25B745D01}" type="datetimeFigureOut">
               <a:rPr lang="hu-HU" smtClean="0"/>
-              <a:t>2023.10.25.</a:t>
+              <a:t>2023.11.14.</a:t>
             </a:fld>
             <a:endParaRPr lang="hu-HU"/>
           </a:p>
@@ -2115,7 +2117,7 @@
           <a:p>
             <a:fld id="{3501FAD6-AC86-4277-8AB6-0EB25B745D01}" type="datetimeFigureOut">
               <a:rPr lang="hu-HU" smtClean="0"/>
-              <a:t>2023.10.25.</a:t>
+              <a:t>2023.11.14.</a:t>
             </a:fld>
             <a:endParaRPr lang="hu-HU"/>
           </a:p>
@@ -2368,7 +2370,7 @@
           <a:p>
             <a:fld id="{3501FAD6-AC86-4277-8AB6-0EB25B745D01}" type="datetimeFigureOut">
               <a:rPr lang="hu-HU" smtClean="0"/>
-              <a:t>2023.10.25.</a:t>
+              <a:t>2023.11.14.</a:t>
             </a:fld>
             <a:endParaRPr lang="hu-HU"/>
           </a:p>
@@ -2581,7 +2583,7 @@
           <a:p>
             <a:fld id="{3501FAD6-AC86-4277-8AB6-0EB25B745D01}" type="datetimeFigureOut">
               <a:rPr lang="hu-HU" smtClean="0"/>
-              <a:t>2023.10.25.</a:t>
+              <a:t>2023.11.14.</a:t>
             </a:fld>
             <a:endParaRPr lang="hu-HU"/>
           </a:p>
@@ -3236,6 +3238,12 @@
               <a:rPr lang="hu-HU" sz="1600" dirty="0"/>
               <a:t>ezért csak az ehhez kompatibilis alaplapokkal és processzorokkal működik. </a:t>
             </a:r>
+            <a:endParaRPr lang="hu-HU" sz="1600" dirty="0" smtClean="0"/>
+          </a:p>
+          <a:p>
+            <a:endParaRPr lang="hu-HU" sz="1600" dirty="0"/>
+          </a:p>
+          <a:p>
             <a:endParaRPr lang="hu-HU" dirty="0"/>
           </a:p>
         </p:txBody>
@@ -3254,6 +3262,357 @@
 </file>
 
 <file path=ppt/slides/slide11.xml><?xml version="1.0" encoding="utf-8"?>
+<p:sld xmlns:a="http://schemas.openxmlformats.org/drawingml/2006/main" xmlns:r="http://schemas.openxmlformats.org/officeDocument/2006/relationships" xmlns:p="http://schemas.openxmlformats.org/presentationml/2006/main">
+  <p:cSld>
+    <p:spTree>
+      <p:nvGrpSpPr>
+        <p:cNvPr id="1" name=""/>
+        <p:cNvGrpSpPr/>
+        <p:nvPr/>
+      </p:nvGrpSpPr>
+      <p:grpSpPr>
+        <a:xfrm>
+          <a:off x="0" y="0"/>
+          <a:ext cx="0" cy="0"/>
+          <a:chOff x="0" y="0"/>
+          <a:chExt cx="0" cy="0"/>
+        </a:xfrm>
+      </p:grpSpPr>
+      <p:sp>
+        <p:nvSpPr>
+          <p:cNvPr id="2" name="Cím 1"/>
+          <p:cNvSpPr>
+            <a:spLocks noGrp="1"/>
+          </p:cNvSpPr>
+          <p:nvPr>
+            <p:ph type="title"/>
+          </p:nvPr>
+        </p:nvSpPr>
+        <p:spPr/>
+        <p:txBody>
+          <a:bodyPr>
+            <a:normAutofit/>
+          </a:bodyPr>
+          <a:lstStyle/>
+          <a:p>
+            <a:r>
+              <a:rPr lang="hu-HU" sz="4000" dirty="0"/>
+              <a:t>Grafikus kártya </a:t>
+            </a:r>
+            <a:r>
+              <a:rPr lang="hu-HU" sz="4000" dirty="0" smtClean="0"/>
+              <a:t>memóriák</a:t>
+            </a:r>
+            <a:endParaRPr lang="hu-HU" sz="4000" dirty="0"/>
+          </a:p>
+        </p:txBody>
+      </p:sp>
+      <p:sp>
+        <p:nvSpPr>
+          <p:cNvPr id="3" name="Tartalom helye 2"/>
+          <p:cNvSpPr>
+            <a:spLocks noGrp="1"/>
+          </p:cNvSpPr>
+          <p:nvPr>
+            <p:ph idx="1"/>
+          </p:nvPr>
+        </p:nvSpPr>
+        <p:spPr>
+          <a:xfrm>
+            <a:off x="838200" y="1750811"/>
+            <a:ext cx="3334789" cy="4351338"/>
+          </a:xfrm>
+        </p:spPr>
+        <p:txBody>
+          <a:bodyPr/>
+          <a:lstStyle/>
+          <a:p>
+            <a:r>
+              <a:rPr lang="hu-HU" sz="1800" dirty="0" smtClean="0"/>
+              <a:t>Gddr5</a:t>
+            </a:r>
+            <a:endParaRPr lang="hu-HU" sz="1800" dirty="0"/>
+          </a:p>
+          <a:p>
+            <a:r>
+              <a:rPr lang="hu-HU" sz="1800" dirty="0" smtClean="0"/>
+              <a:t>Gddr6</a:t>
+            </a:r>
+            <a:endParaRPr lang="hu-HU" sz="1800" dirty="0"/>
+          </a:p>
+          <a:p>
+            <a:r>
+              <a:rPr lang="hu-HU" sz="1800" dirty="0" smtClean="0"/>
+              <a:t>Gddr6x</a:t>
+            </a:r>
+            <a:endParaRPr lang="hu-HU" sz="1800" dirty="0"/>
+          </a:p>
+          <a:p>
+            <a:r>
+              <a:rPr lang="hu-HU" sz="1800" dirty="0" smtClean="0"/>
+              <a:t>Gddr7</a:t>
+            </a:r>
+            <a:endParaRPr lang="hu-HU" sz="1800" dirty="0"/>
+          </a:p>
+          <a:p>
+            <a:endParaRPr lang="hu-HU" sz="1600" dirty="0" smtClean="0"/>
+          </a:p>
+          <a:p>
+            <a:pPr marL="0" indent="0">
+              <a:buNone/>
+            </a:pPr>
+            <a:r>
+              <a:rPr lang="hu-HU" sz="1600" dirty="0"/>
+              <a:t>A GDDR5 memória alap </a:t>
+            </a:r>
+            <a:r>
+              <a:rPr lang="hu-HU" sz="1600" dirty="0" smtClean="0"/>
+              <a:t>órajele: 1400, </a:t>
+            </a:r>
+            <a:r>
+              <a:rPr lang="hu-HU" sz="1600" dirty="0" err="1" smtClean="0"/>
+              <a:t>bootolás</a:t>
+            </a:r>
+            <a:r>
+              <a:rPr lang="hu-HU" sz="1600" dirty="0" smtClean="0"/>
+              <a:t> </a:t>
+            </a:r>
+            <a:r>
+              <a:rPr lang="hu-HU" sz="1600" dirty="0"/>
+              <a:t>alatt </a:t>
+            </a:r>
+            <a:r>
+              <a:rPr lang="hu-HU" sz="1600" dirty="0" smtClean="0"/>
+              <a:t>1540 is lehet.</a:t>
+            </a:r>
+            <a:endParaRPr lang="hu-HU" sz="1600" dirty="0"/>
+          </a:p>
+          <a:p>
+            <a:pPr marL="0" indent="0">
+              <a:buNone/>
+            </a:pPr>
+            <a:r>
+              <a:rPr lang="hu-HU" sz="1600" dirty="0"/>
+              <a:t>A GDDR6 </a:t>
+            </a:r>
+            <a:r>
+              <a:rPr lang="hu-HU" sz="1600" dirty="0" smtClean="0"/>
+              <a:t>alapsebessége: </a:t>
+            </a:r>
+            <a:r>
+              <a:rPr lang="hu-HU" sz="1600" dirty="0"/>
+              <a:t>1650 </a:t>
+            </a:r>
+            <a:r>
+              <a:rPr lang="hu-HU" sz="1600" dirty="0" smtClean="0"/>
+              <a:t>MHz, </a:t>
+            </a:r>
+            <a:r>
+              <a:rPr lang="hu-HU" sz="1600" dirty="0" err="1" smtClean="0"/>
+              <a:t>bootolás</a:t>
+            </a:r>
+            <a:r>
+              <a:rPr lang="hu-HU" sz="1600" dirty="0" smtClean="0"/>
+              <a:t> </a:t>
+            </a:r>
+            <a:r>
+              <a:rPr lang="hu-HU" sz="1600" dirty="0"/>
+              <a:t>alatt 1770 </a:t>
+            </a:r>
+            <a:r>
+              <a:rPr lang="hu-HU" sz="1600" dirty="0" smtClean="0"/>
+              <a:t>MHz.</a:t>
+            </a:r>
+            <a:endParaRPr lang="hu-HU" sz="1050" dirty="0"/>
+          </a:p>
+        </p:txBody>
+      </p:sp>
+      <p:pic>
+        <p:nvPicPr>
+          <p:cNvPr id="4" name="Kép 3"/>
+          <p:cNvPicPr>
+            <a:picLocks noChangeAspect="1"/>
+          </p:cNvPicPr>
+          <p:nvPr/>
+        </p:nvPicPr>
+        <p:blipFill>
+          <a:blip r:embed="rId2"/>
+          <a:stretch>
+            <a:fillRect/>
+          </a:stretch>
+        </p:blipFill>
+        <p:spPr>
+          <a:xfrm>
+            <a:off x="5020888" y="1989947"/>
+            <a:ext cx="4655127" cy="2567593"/>
+          </a:xfrm>
+          <a:prstGeom prst="rect">
+            <a:avLst/>
+          </a:prstGeom>
+        </p:spPr>
+      </p:pic>
+    </p:spTree>
+    <p:extLst>
+      <p:ext uri="{BB962C8B-B14F-4D97-AF65-F5344CB8AC3E}">
+        <p14:creationId xmlns:p14="http://schemas.microsoft.com/office/powerpoint/2010/main" val="1070706030"/>
+      </p:ext>
+    </p:extLst>
+  </p:cSld>
+  <p:clrMapOvr>
+    <a:masterClrMapping/>
+  </p:clrMapOvr>
+</p:sld>
+</file>
+
+<file path=ppt/slides/slide12.xml><?xml version="1.0" encoding="utf-8"?>
+<p:sld xmlns:a="http://schemas.openxmlformats.org/drawingml/2006/main" xmlns:r="http://schemas.openxmlformats.org/officeDocument/2006/relationships" xmlns:p="http://schemas.openxmlformats.org/presentationml/2006/main">
+  <p:cSld>
+    <p:spTree>
+      <p:nvGrpSpPr>
+        <p:cNvPr id="1" name=""/>
+        <p:cNvGrpSpPr/>
+        <p:nvPr/>
+      </p:nvGrpSpPr>
+      <p:grpSpPr>
+        <a:xfrm>
+          <a:off x="0" y="0"/>
+          <a:ext cx="0" cy="0"/>
+          <a:chOff x="0" y="0"/>
+          <a:chExt cx="0" cy="0"/>
+        </a:xfrm>
+      </p:grpSpPr>
+      <p:sp>
+        <p:nvSpPr>
+          <p:cNvPr id="2" name="Cím 1"/>
+          <p:cNvSpPr>
+            <a:spLocks noGrp="1"/>
+          </p:cNvSpPr>
+          <p:nvPr>
+            <p:ph type="title"/>
+          </p:nvPr>
+        </p:nvSpPr>
+        <p:spPr/>
+        <p:txBody>
+          <a:bodyPr>
+            <a:normAutofit/>
+          </a:bodyPr>
+          <a:lstStyle/>
+          <a:p>
+            <a:r>
+              <a:rPr lang="hu-HU" sz="3600" dirty="0" smtClean="0"/>
+              <a:t>GDDR7</a:t>
+            </a:r>
+            <a:endParaRPr lang="hu-HU" sz="3600" dirty="0"/>
+          </a:p>
+        </p:txBody>
+      </p:sp>
+      <p:sp>
+        <p:nvSpPr>
+          <p:cNvPr id="3" name="Tartalom helye 2"/>
+          <p:cNvSpPr>
+            <a:spLocks noGrp="1"/>
+          </p:cNvSpPr>
+          <p:nvPr>
+            <p:ph idx="1"/>
+          </p:nvPr>
+        </p:nvSpPr>
+        <p:spPr>
+          <a:xfrm>
+            <a:off x="838200" y="1825625"/>
+            <a:ext cx="6302433" cy="4351338"/>
+          </a:xfrm>
+        </p:spPr>
+        <p:txBody>
+          <a:bodyPr>
+            <a:normAutofit/>
+          </a:bodyPr>
+          <a:lstStyle/>
+          <a:p>
+            <a:r>
+              <a:rPr lang="hu-HU" sz="2000" dirty="0" smtClean="0"/>
+              <a:t>36 </a:t>
+            </a:r>
+            <a:r>
+              <a:rPr lang="hu-HU" sz="2000" dirty="0"/>
+              <a:t>Gbps sebességre is képesek lesznek </a:t>
+            </a:r>
+            <a:endParaRPr lang="hu-HU" sz="2000" dirty="0" smtClean="0"/>
+          </a:p>
+          <a:p>
+            <a:r>
+              <a:rPr lang="hu-HU" sz="2000" dirty="0" smtClean="0"/>
+              <a:t>50</a:t>
+            </a:r>
+            <a:r>
+              <a:rPr lang="hu-HU" sz="2000" dirty="0"/>
+              <a:t>%-kal több sávszélesség </a:t>
+            </a:r>
+            <a:r>
+              <a:rPr lang="hu-HU" sz="2000" dirty="0" smtClean="0"/>
+              <a:t>növekedés GDDR6X-hez képest</a:t>
+            </a:r>
+          </a:p>
+          <a:p>
+            <a:r>
+              <a:rPr lang="hu-HU" sz="2000" dirty="0" smtClean="0"/>
+              <a:t>Egyszerre </a:t>
+            </a:r>
+            <a:r>
+              <a:rPr lang="hu-HU" sz="2000" dirty="0"/>
+              <a:t>lehetnek erősebbek, gyorsabbak és közben </a:t>
+            </a:r>
+            <a:r>
+              <a:rPr lang="hu-HU" sz="2000" dirty="0" smtClean="0"/>
+              <a:t>energiahatékonyabbak</a:t>
+            </a:r>
+            <a:endParaRPr lang="hu-HU" sz="2000" dirty="0"/>
+          </a:p>
+          <a:p>
+            <a:pPr marL="0" indent="0">
+              <a:buNone/>
+            </a:pPr>
+            <a:endParaRPr lang="hu-HU" sz="2000" dirty="0"/>
+          </a:p>
+        </p:txBody>
+      </p:sp>
+      <p:pic>
+        <p:nvPicPr>
+          <p:cNvPr id="5" name="Kép 4"/>
+          <p:cNvPicPr>
+            <a:picLocks noChangeAspect="1"/>
+          </p:cNvPicPr>
+          <p:nvPr/>
+        </p:nvPicPr>
+        <p:blipFill>
+          <a:blip r:embed="rId2"/>
+          <a:stretch>
+            <a:fillRect/>
+          </a:stretch>
+        </p:blipFill>
+        <p:spPr>
+          <a:xfrm>
+            <a:off x="7913716" y="2151221"/>
+            <a:ext cx="2909714" cy="1911797"/>
+          </a:xfrm>
+          <a:prstGeom prst="rect">
+            <a:avLst/>
+          </a:prstGeom>
+        </p:spPr>
+      </p:pic>
+    </p:spTree>
+    <p:extLst>
+      <p:ext uri="{BB962C8B-B14F-4D97-AF65-F5344CB8AC3E}">
+        <p14:creationId xmlns:p14="http://schemas.microsoft.com/office/powerpoint/2010/main" val="4157483963"/>
+      </p:ext>
+    </p:extLst>
+  </p:cSld>
+  <p:clrMapOvr>
+    <a:masterClrMapping/>
+  </p:clrMapOvr>
+</p:sld>
+</file>
+
+<file path=ppt/slides/slide13.xml><?xml version="1.0" encoding="utf-8"?>
 <p:sld xmlns:a="http://schemas.openxmlformats.org/drawingml/2006/main" xmlns:r="http://schemas.openxmlformats.org/officeDocument/2006/relationships" xmlns:p="http://schemas.openxmlformats.org/presentationml/2006/main">
   <p:cSld>
     <p:spTree>
@@ -3377,7 +3736,7 @@
 </p:sld>
 </file>
 
-<file path=ppt/slides/slide12.xml><?xml version="1.0" encoding="utf-8"?>
+<file path=ppt/slides/slide14.xml><?xml version="1.0" encoding="utf-8"?>
 <p:sld xmlns:a="http://schemas.openxmlformats.org/drawingml/2006/main" xmlns:r="http://schemas.openxmlformats.org/officeDocument/2006/relationships" xmlns:p="http://schemas.openxmlformats.org/presentationml/2006/main">
   <p:cSld>
     <p:spTree>
@@ -3519,405 +3878,6 @@
 </p:sld>
 </file>
 
-<file path=ppt/slides/slide13.xml><?xml version="1.0" encoding="utf-8"?>
-<p:sld xmlns:a="http://schemas.openxmlformats.org/drawingml/2006/main" xmlns:r="http://schemas.openxmlformats.org/officeDocument/2006/relationships" xmlns:p="http://schemas.openxmlformats.org/presentationml/2006/main">
-  <p:cSld>
-    <p:spTree>
-      <p:nvGrpSpPr>
-        <p:cNvPr id="1" name=""/>
-        <p:cNvGrpSpPr/>
-        <p:nvPr/>
-      </p:nvGrpSpPr>
-      <p:grpSpPr>
-        <a:xfrm>
-          <a:off x="0" y="0"/>
-          <a:ext cx="0" cy="0"/>
-          <a:chOff x="0" y="0"/>
-          <a:chExt cx="0" cy="0"/>
-        </a:xfrm>
-      </p:grpSpPr>
-      <p:sp>
-        <p:nvSpPr>
-          <p:cNvPr id="2" name="Cím 1"/>
-          <p:cNvSpPr>
-            <a:spLocks noGrp="1"/>
-          </p:cNvSpPr>
-          <p:nvPr>
-            <p:ph type="title"/>
-          </p:nvPr>
-        </p:nvSpPr>
-        <p:spPr/>
-        <p:txBody>
-          <a:bodyPr/>
-          <a:lstStyle/>
-          <a:p>
-            <a:r>
-              <a:rPr lang="hu-HU" dirty="0"/>
-              <a:t>A processzor főbb </a:t>
-            </a:r>
-            <a:r>
-              <a:rPr lang="hu-HU" dirty="0" smtClean="0"/>
-              <a:t>részei</a:t>
-            </a:r>
-            <a:endParaRPr lang="hu-HU" dirty="0"/>
-          </a:p>
-        </p:txBody>
-      </p:sp>
-      <p:sp>
-        <p:nvSpPr>
-          <p:cNvPr id="3" name="Tartalom helye 2"/>
-          <p:cNvSpPr>
-            <a:spLocks noGrp="1"/>
-          </p:cNvSpPr>
-          <p:nvPr>
-            <p:ph idx="1"/>
-          </p:nvPr>
-        </p:nvSpPr>
-        <p:spPr/>
-        <p:txBody>
-          <a:bodyPr>
-            <a:normAutofit/>
-          </a:bodyPr>
-          <a:lstStyle/>
-          <a:p>
-            <a:pPr marL="0" indent="0">
-              <a:buNone/>
-            </a:pPr>
-            <a:r>
-              <a:rPr lang="hu-HU" b="1" dirty="0"/>
-              <a:t>ALU</a:t>
-            </a:r>
-            <a:r>
-              <a:rPr lang="hu-HU" dirty="0"/>
-              <a:t> (</a:t>
-            </a:r>
-            <a:r>
-              <a:rPr lang="hu-HU" dirty="0" err="1"/>
-              <a:t>Arithmetic</a:t>
-            </a:r>
-            <a:r>
-              <a:rPr lang="hu-HU" dirty="0"/>
-              <a:t> </a:t>
-            </a:r>
-            <a:r>
-              <a:rPr lang="hu-HU" dirty="0" smtClean="0"/>
-              <a:t>and </a:t>
-            </a:r>
-            <a:r>
-              <a:rPr lang="hu-HU" dirty="0" err="1"/>
-              <a:t>Logical</a:t>
-            </a:r>
-            <a:r>
-              <a:rPr lang="hu-HU" dirty="0"/>
-              <a:t> Unit - Aritmetikai és Logikai Egység</a:t>
-            </a:r>
-            <a:r>
-              <a:rPr lang="hu-HU" dirty="0" smtClean="0"/>
-              <a:t>):</a:t>
-            </a:r>
-          </a:p>
-          <a:p>
-            <a:r>
-              <a:rPr lang="hu-HU" sz="2400" dirty="0"/>
-              <a:t>a</a:t>
-            </a:r>
-            <a:r>
-              <a:rPr lang="hu-HU" sz="2400" dirty="0" smtClean="0"/>
-              <a:t> </a:t>
-            </a:r>
-            <a:r>
-              <a:rPr lang="hu-HU" sz="2400" dirty="0"/>
-              <a:t>processzor alapvető </a:t>
-            </a:r>
-            <a:r>
-              <a:rPr lang="hu-HU" sz="2400" dirty="0" smtClean="0"/>
-              <a:t>alkotórésze</a:t>
-            </a:r>
-          </a:p>
-          <a:p>
-            <a:r>
-              <a:rPr lang="hu-HU" sz="2400" dirty="0"/>
-              <a:t>alapvető matematikai és logikai műveleteket hajt </a:t>
-            </a:r>
-            <a:r>
-              <a:rPr lang="hu-HU" sz="2400" dirty="0" smtClean="0"/>
-              <a:t>végre</a:t>
-            </a:r>
-          </a:p>
-          <a:p>
-            <a:endParaRPr lang="hu-HU" dirty="0" smtClean="0"/>
-          </a:p>
-          <a:p>
-            <a:pPr marL="0" indent="0">
-              <a:buNone/>
-            </a:pPr>
-            <a:r>
-              <a:rPr lang="hu-HU" b="1" dirty="0"/>
-              <a:t>AGU </a:t>
-            </a:r>
-            <a:r>
-              <a:rPr lang="hu-HU" dirty="0"/>
-              <a:t>(</a:t>
-            </a:r>
-            <a:r>
-              <a:rPr lang="hu-HU" dirty="0" err="1"/>
-              <a:t>Address</a:t>
-            </a:r>
-            <a:r>
-              <a:rPr lang="hu-HU" dirty="0"/>
-              <a:t> </a:t>
-            </a:r>
-            <a:r>
-              <a:rPr lang="hu-HU" dirty="0" err="1"/>
-              <a:t>Generation</a:t>
-            </a:r>
-            <a:r>
-              <a:rPr lang="hu-HU" dirty="0"/>
-              <a:t> Unit): </a:t>
-            </a:r>
-            <a:endParaRPr lang="hu-HU" dirty="0" smtClean="0"/>
-          </a:p>
-          <a:p>
-            <a:r>
-              <a:rPr lang="hu-HU" sz="2400" dirty="0"/>
-              <a:t>a</a:t>
-            </a:r>
-            <a:r>
-              <a:rPr lang="hu-HU" sz="2400" dirty="0" smtClean="0"/>
-              <a:t> </a:t>
-            </a:r>
-            <a:r>
-              <a:rPr lang="hu-HU" sz="2400" dirty="0"/>
-              <a:t>címszámító </a:t>
-            </a:r>
-            <a:r>
-              <a:rPr lang="hu-HU" sz="2400" dirty="0" smtClean="0"/>
-              <a:t>egység</a:t>
-            </a:r>
-          </a:p>
-          <a:p>
-            <a:r>
-              <a:rPr lang="hu-HU" sz="2400" dirty="0" smtClean="0"/>
-              <a:t>címek </a:t>
-            </a:r>
-            <a:r>
-              <a:rPr lang="hu-HU" sz="2400" dirty="0" err="1"/>
-              <a:t>leképezése</a:t>
-            </a:r>
-            <a:r>
-              <a:rPr lang="hu-HU" sz="2400" dirty="0"/>
-              <a:t> a </a:t>
-            </a:r>
-            <a:r>
-              <a:rPr lang="hu-HU" sz="2400" dirty="0" err="1"/>
-              <a:t>főtár</a:t>
-            </a:r>
-            <a:r>
-              <a:rPr lang="hu-HU" sz="2400" dirty="0"/>
-              <a:t> fizikai címeire és a tároló védelmi hibák </a:t>
-            </a:r>
-            <a:r>
-              <a:rPr lang="hu-HU" sz="2400" dirty="0" smtClean="0"/>
-              <a:t>felismerése</a:t>
-            </a:r>
-            <a:endParaRPr lang="hu-HU" sz="2400" dirty="0"/>
-          </a:p>
-          <a:p>
-            <a:pPr marL="0" indent="0">
-              <a:buNone/>
-            </a:pPr>
-            <a:endParaRPr lang="hu-HU" dirty="0"/>
-          </a:p>
-        </p:txBody>
-      </p:sp>
-    </p:spTree>
-    <p:extLst>
-      <p:ext uri="{BB962C8B-B14F-4D97-AF65-F5344CB8AC3E}">
-        <p14:creationId xmlns:p14="http://schemas.microsoft.com/office/powerpoint/2010/main" val="3115901939"/>
-      </p:ext>
-    </p:extLst>
-  </p:cSld>
-  <p:clrMapOvr>
-    <a:masterClrMapping/>
-  </p:clrMapOvr>
-</p:sld>
-</file>
-
-<file path=ppt/slides/slide14.xml><?xml version="1.0" encoding="utf-8"?>
-<p:sld xmlns:a="http://schemas.openxmlformats.org/drawingml/2006/main" xmlns:r="http://schemas.openxmlformats.org/officeDocument/2006/relationships" xmlns:p="http://schemas.openxmlformats.org/presentationml/2006/main">
-  <p:cSld>
-    <p:spTree>
-      <p:nvGrpSpPr>
-        <p:cNvPr id="1" name=""/>
-        <p:cNvGrpSpPr/>
-        <p:nvPr/>
-      </p:nvGrpSpPr>
-      <p:grpSpPr>
-        <a:xfrm>
-          <a:off x="0" y="0"/>
-          <a:ext cx="0" cy="0"/>
-          <a:chOff x="0" y="0"/>
-          <a:chExt cx="0" cy="0"/>
-        </a:xfrm>
-      </p:grpSpPr>
-      <p:sp>
-        <p:nvSpPr>
-          <p:cNvPr id="2" name="Cím 1"/>
-          <p:cNvSpPr>
-            <a:spLocks noGrp="1"/>
-          </p:cNvSpPr>
-          <p:nvPr>
-            <p:ph type="title"/>
-          </p:nvPr>
-        </p:nvSpPr>
-        <p:spPr/>
-        <p:txBody>
-          <a:bodyPr/>
-          <a:lstStyle/>
-          <a:p>
-            <a:r>
-              <a:rPr lang="hu-HU" dirty="0"/>
-              <a:t>A processzor főbb részei</a:t>
-            </a:r>
-          </a:p>
-        </p:txBody>
-      </p:sp>
-      <p:sp>
-        <p:nvSpPr>
-          <p:cNvPr id="3" name="Tartalom helye 2"/>
-          <p:cNvSpPr>
-            <a:spLocks noGrp="1"/>
-          </p:cNvSpPr>
-          <p:nvPr>
-            <p:ph idx="1"/>
-          </p:nvPr>
-        </p:nvSpPr>
-        <p:spPr/>
-        <p:txBody>
-          <a:bodyPr/>
-          <a:lstStyle/>
-          <a:p>
-            <a:pPr marL="0" lvl="0" indent="0">
-              <a:buNone/>
-            </a:pPr>
-            <a:r>
-              <a:rPr lang="hu-HU" b="1" dirty="0"/>
-              <a:t>CU</a:t>
-            </a:r>
-            <a:r>
-              <a:rPr lang="hu-HU" dirty="0"/>
-              <a:t> (</a:t>
-            </a:r>
-            <a:r>
-              <a:rPr lang="hu-HU" dirty="0" err="1"/>
-              <a:t>Control</a:t>
-            </a:r>
-            <a:r>
-              <a:rPr lang="hu-HU" dirty="0"/>
-              <a:t> Unit - Vezérlőegység vagy Vezérlőáramkör): </a:t>
-            </a:r>
-            <a:endParaRPr lang="hu-HU" dirty="0" smtClean="0"/>
-          </a:p>
-          <a:p>
-            <a:pPr lvl="0"/>
-            <a:r>
-              <a:rPr lang="hu-HU" dirty="0"/>
-              <a:t>e</a:t>
-            </a:r>
-            <a:r>
-              <a:rPr lang="hu-HU" dirty="0" smtClean="0"/>
-              <a:t>z </a:t>
-            </a:r>
-            <a:r>
-              <a:rPr lang="hu-HU" dirty="0"/>
-              <a:t>szervezi, ütemezi a processzor egész </a:t>
-            </a:r>
-            <a:r>
-              <a:rPr lang="hu-HU" dirty="0" smtClean="0"/>
-              <a:t>munkáját</a:t>
-            </a:r>
-          </a:p>
-          <a:p>
-            <a:pPr lvl="0"/>
-            <a:r>
-              <a:rPr lang="hu-HU" dirty="0" smtClean="0"/>
-              <a:t>lehívja </a:t>
-            </a:r>
-            <a:r>
-              <a:rPr lang="hu-HU" dirty="0"/>
-              <a:t>a memóriából a soron következő utasítást, értelmezi és </a:t>
-            </a:r>
-            <a:r>
-              <a:rPr lang="hu-HU" dirty="0" err="1"/>
-              <a:t>végrehajtatja</a:t>
-            </a:r>
-            <a:r>
-              <a:rPr lang="hu-HU" dirty="0"/>
-              <a:t> azt, majd meghatározza a következő utasítás </a:t>
-            </a:r>
-            <a:r>
-              <a:rPr lang="hu-HU" dirty="0" smtClean="0"/>
-              <a:t>címét</a:t>
-            </a:r>
-          </a:p>
-          <a:p>
-            <a:pPr marL="0" lvl="0" indent="0">
-              <a:buNone/>
-            </a:pPr>
-            <a:endParaRPr lang="hu-HU" dirty="0"/>
-          </a:p>
-          <a:p>
-            <a:pPr marL="0" lvl="0" indent="0">
-              <a:buNone/>
-            </a:pPr>
-            <a:r>
-              <a:rPr lang="hu-HU" b="1" dirty="0"/>
-              <a:t>Regiszter </a:t>
-            </a:r>
-            <a:r>
-              <a:rPr lang="hu-HU" dirty="0"/>
-              <a:t>(</a:t>
-            </a:r>
-            <a:r>
-              <a:rPr lang="hu-HU" dirty="0" err="1"/>
-              <a:t>Register</a:t>
-            </a:r>
-            <a:r>
-              <a:rPr lang="hu-HU" dirty="0" smtClean="0"/>
-              <a:t>):</a:t>
-            </a:r>
-          </a:p>
-          <a:p>
-            <a:pPr lvl="0"/>
-            <a:r>
-              <a:rPr lang="hu-HU" dirty="0" smtClean="0"/>
-              <a:t>A </a:t>
-            </a:r>
-            <a:r>
-              <a:rPr lang="hu-HU" dirty="0"/>
-              <a:t>regiszter a processzorba beépített nagyon gyors elérésű, kis méretű memória</a:t>
-            </a:r>
-            <a:r>
-              <a:rPr lang="hu-HU"/>
-              <a:t>. </a:t>
-            </a:r>
-            <a:endParaRPr lang="hu-HU" dirty="0"/>
-          </a:p>
-        </p:txBody>
-      </p:sp>
-    </p:spTree>
-    <p:extLst>
-      <p:ext uri="{BB962C8B-B14F-4D97-AF65-F5344CB8AC3E}">
-        <p14:creationId xmlns:p14="http://schemas.microsoft.com/office/powerpoint/2010/main" val="4091424038"/>
-      </p:ext>
-    </p:extLst>
-  </p:cSld>
-  <p:clrMapOvr>
-    <a:masterClrMapping/>
-  </p:clrMapOvr>
-</p:sld>
-</file>
-
 <file path=ppt/slides/slide15.xml><?xml version="1.0" encoding="utf-8"?>
 <p:sld xmlns:a="http://schemas.openxmlformats.org/drawingml/2006/main" xmlns:r="http://schemas.openxmlformats.org/officeDocument/2006/relationships" xmlns:p="http://schemas.openxmlformats.org/presentationml/2006/main">
   <p:cSld>
@@ -3947,18 +3907,17 @@
         </p:nvSpPr>
         <p:spPr/>
         <p:txBody>
-          <a:bodyPr>
-            <a:normAutofit fontScale="90000"/>
-          </a:bodyPr>
+          <a:bodyPr/>
           <a:lstStyle/>
           <a:p>
             <a:r>
               <a:rPr lang="hu-HU" dirty="0"/>
-              <a:t>Hatással van a magas hőmérséklet a CPU élettartamára vagy stabilitására?</a:t>
-            </a:r>
-            <a:br>
-              <a:rPr lang="hu-HU" dirty="0"/>
-            </a:br>
+              <a:t>A processzor főbb </a:t>
+            </a:r>
+            <a:r>
+              <a:rPr lang="hu-HU" dirty="0" smtClean="0"/>
+              <a:t>részei</a:t>
+            </a:r>
             <a:endParaRPr lang="hu-HU" dirty="0"/>
           </a:p>
         </p:txBody>
@@ -3980,47 +3939,160 @@
           </a:bodyPr>
           <a:lstStyle/>
           <a:p>
-            <a:r>
-              <a:rPr lang="hu-HU" sz="2000" dirty="0"/>
-              <a:t>Amíg a hőmérséklet alacsonyabb az Intel által meghatározott eredeti standardnál (105 vagy 100 Celsius-fok), az a CPU élettartamára nem lesz hatással. </a:t>
-            </a:r>
-            <a:endParaRPr lang="hu-HU" sz="2000" dirty="0" smtClean="0"/>
-          </a:p>
-          <a:p>
-            <a:r>
-              <a:rPr lang="hu-HU" sz="2000" dirty="0" smtClean="0"/>
+            <a:pPr marL="0" indent="0">
+              <a:buNone/>
+            </a:pPr>
+            <a:r>
+              <a:rPr lang="hu-HU" b="1" dirty="0"/>
+              <a:t>ALU</a:t>
+            </a:r>
+            <a:r>
+              <a:rPr lang="hu-HU" dirty="0"/>
+              <a:t> (</a:t>
+            </a:r>
+            <a:r>
+              <a:rPr lang="hu-HU" dirty="0" err="1"/>
+              <a:t>Arithmetic</a:t>
+            </a:r>
+            <a:r>
+              <a:rPr lang="hu-HU" dirty="0"/>
               <a:t> </a:t>
             </a:r>
             <a:r>
-              <a:rPr lang="hu-HU" sz="2000" dirty="0"/>
-              <a:t>A CPU </a:t>
-            </a:r>
-            <a:r>
-              <a:rPr lang="hu-HU" sz="2000" dirty="0" smtClean="0"/>
-              <a:t>saját </a:t>
-            </a:r>
-            <a:r>
-              <a:rPr lang="hu-HU" sz="2000" dirty="0"/>
-              <a:t>védelmi rendszerrel, védőmechanizmussal rendelkezik. </a:t>
-            </a:r>
-            <a:endParaRPr lang="hu-HU" sz="2000" dirty="0" smtClean="0"/>
-          </a:p>
-          <a:p>
-            <a:r>
-              <a:rPr lang="hu-HU" sz="2000" dirty="0" smtClean="0"/>
-              <a:t>Ha </a:t>
-            </a:r>
-            <a:r>
-              <a:rPr lang="hu-HU" sz="2000" dirty="0"/>
-              <a:t>a mag hőmérséklete meghaladja az előzőleg meghatározott hőmérsékletet, a gép teljesítménye a biztonságos hőmérséklet fenntartása érdekében csökken.</a:t>
-            </a:r>
+              <a:rPr lang="hu-HU" dirty="0" smtClean="0"/>
+              <a:t>and </a:t>
+            </a:r>
+            <a:r>
+              <a:rPr lang="hu-HU" dirty="0" err="1"/>
+              <a:t>Logical</a:t>
+            </a:r>
+            <a:r>
+              <a:rPr lang="hu-HU" dirty="0"/>
+              <a:t> Unit - Aritmetikai és Logikai Egység</a:t>
+            </a:r>
+            <a:r>
+              <a:rPr lang="hu-HU" dirty="0" smtClean="0"/>
+              <a:t>):</a:t>
+            </a:r>
+          </a:p>
+          <a:p>
+            <a:r>
+              <a:rPr lang="hu-HU" sz="2400" dirty="0"/>
+              <a:t>a</a:t>
+            </a:r>
+            <a:r>
+              <a:rPr lang="hu-HU" sz="2400" dirty="0" smtClean="0"/>
+              <a:t> </a:t>
+            </a:r>
+            <a:r>
+              <a:rPr lang="hu-HU" sz="2400" dirty="0"/>
+              <a:t>processzor alapvető </a:t>
+            </a:r>
+            <a:r>
+              <a:rPr lang="hu-HU" sz="2400" dirty="0" smtClean="0"/>
+              <a:t>alkotórésze</a:t>
+            </a:r>
+          </a:p>
+          <a:p>
+            <a:r>
+              <a:rPr lang="hu-HU" sz="2400" dirty="0"/>
+              <a:t>alapvető matematikai és logikai műveleteket hajt </a:t>
+            </a:r>
+            <a:r>
+              <a:rPr lang="hu-HU" sz="2400" dirty="0" smtClean="0"/>
+              <a:t>végre</a:t>
+            </a:r>
+          </a:p>
+          <a:p>
+            <a:endParaRPr lang="hu-HU" dirty="0" smtClean="0"/>
+          </a:p>
+          <a:p>
+            <a:pPr marL="0" indent="0">
+              <a:buNone/>
+            </a:pPr>
+            <a:r>
+              <a:rPr lang="hu-HU" b="1" dirty="0"/>
+              <a:t>AGU </a:t>
+            </a:r>
+            <a:r>
+              <a:rPr lang="hu-HU" dirty="0"/>
+              <a:t>(</a:t>
+            </a:r>
+            <a:r>
+              <a:rPr lang="hu-HU" dirty="0" err="1"/>
+              <a:t>Address</a:t>
+            </a:r>
+            <a:r>
+              <a:rPr lang="hu-HU" dirty="0"/>
+              <a:t> </a:t>
+            </a:r>
+            <a:r>
+              <a:rPr lang="hu-HU" dirty="0" err="1"/>
+              <a:t>Generation</a:t>
+            </a:r>
+            <a:r>
+              <a:rPr lang="hu-HU" dirty="0"/>
+              <a:t> Unit): </a:t>
+            </a:r>
+            <a:endParaRPr lang="hu-HU" dirty="0" smtClean="0"/>
+          </a:p>
+          <a:p>
+            <a:r>
+              <a:rPr lang="hu-HU" sz="2400" dirty="0"/>
+              <a:t>a</a:t>
+            </a:r>
+            <a:r>
+              <a:rPr lang="hu-HU" sz="2400" dirty="0" smtClean="0"/>
+              <a:t> </a:t>
+            </a:r>
+            <a:r>
+              <a:rPr lang="hu-HU" sz="2400" dirty="0"/>
+              <a:t>címszámító </a:t>
+            </a:r>
+            <a:r>
+              <a:rPr lang="hu-HU" sz="2400" dirty="0" smtClean="0"/>
+              <a:t>egység</a:t>
+            </a:r>
+          </a:p>
+          <a:p>
+            <a:r>
+              <a:rPr lang="hu-HU" sz="2400" dirty="0" smtClean="0"/>
+              <a:t>címek </a:t>
+            </a:r>
+            <a:r>
+              <a:rPr lang="hu-HU" sz="2400" dirty="0" err="1"/>
+              <a:t>leképezése</a:t>
+            </a:r>
+            <a:r>
+              <a:rPr lang="hu-HU" sz="2400" dirty="0"/>
+              <a:t> a </a:t>
+            </a:r>
+            <a:r>
+              <a:rPr lang="hu-HU" sz="2400" dirty="0" err="1"/>
+              <a:t>főtár</a:t>
+            </a:r>
+            <a:r>
+              <a:rPr lang="hu-HU" sz="2400" dirty="0"/>
+              <a:t> fizikai címeire és a tároló védelmi hibák </a:t>
+            </a:r>
+            <a:r>
+              <a:rPr lang="hu-HU" sz="2400" dirty="0" smtClean="0"/>
+              <a:t>felismerése</a:t>
+            </a:r>
+            <a:endParaRPr lang="hu-HU" sz="2400" dirty="0"/>
+          </a:p>
+          <a:p>
+            <a:pPr marL="0" indent="0">
+              <a:buNone/>
+            </a:pPr>
+            <a:endParaRPr lang="hu-HU" dirty="0"/>
           </a:p>
         </p:txBody>
       </p:sp>
     </p:spTree>
     <p:extLst>
       <p:ext uri="{BB962C8B-B14F-4D97-AF65-F5344CB8AC3E}">
-        <p14:creationId xmlns:p14="http://schemas.microsoft.com/office/powerpoint/2010/main" val="3982985037"/>
+        <p14:creationId xmlns:p14="http://schemas.microsoft.com/office/powerpoint/2010/main" val="3115901939"/>
       </p:ext>
     </p:extLst>
   </p:cSld>
@@ -4063,128 +4135,139 @@
           <a:lstStyle/>
           <a:p>
             <a:r>
-              <a:rPr lang="hu-HU" sz="3600" b="1" dirty="0"/>
-              <a:t>A hőmérséklet kijelzése</a:t>
-            </a:r>
+              <a:rPr lang="hu-HU" dirty="0"/>
+              <a:t>A processzor főbb részei</a:t>
+            </a:r>
+          </a:p>
+        </p:txBody>
+      </p:sp>
+      <p:sp>
+        <p:nvSpPr>
+          <p:cNvPr id="3" name="Tartalom helye 2"/>
+          <p:cNvSpPr>
+            <a:spLocks noGrp="1"/>
+          </p:cNvSpPr>
+          <p:nvPr>
+            <p:ph idx="1"/>
+          </p:nvPr>
+        </p:nvSpPr>
+        <p:spPr/>
+        <p:txBody>
+          <a:bodyPr/>
+          <a:lstStyle/>
+          <a:p>
+            <a:pPr marL="0" lvl="0" indent="0">
+              <a:buNone/>
+            </a:pPr>
             <a:r>
               <a:rPr lang="hu-HU" b="1" dirty="0"/>
-              <a:t/>
-            </a:r>
-            <a:br>
+              <a:t>CU</a:t>
+            </a:r>
+            <a:r>
+              <a:rPr lang="hu-HU" dirty="0"/>
+              <a:t> (</a:t>
+            </a:r>
+            <a:r>
+              <a:rPr lang="hu-HU" dirty="0" err="1"/>
+              <a:t>Control</a:t>
+            </a:r>
+            <a:r>
+              <a:rPr lang="hu-HU" dirty="0"/>
+              <a:t> Unit - Vezérlőegység vagy Vezérlőáramkör): </a:t>
+            </a:r>
+            <a:endParaRPr lang="hu-HU" dirty="0" smtClean="0"/>
+          </a:p>
+          <a:p>
+            <a:pPr lvl="0"/>
+            <a:r>
+              <a:rPr lang="hu-HU" dirty="0"/>
+              <a:t>e</a:t>
+            </a:r>
+            <a:r>
+              <a:rPr lang="hu-HU" dirty="0" smtClean="0"/>
+              <a:t>z </a:t>
+            </a:r>
+            <a:r>
+              <a:rPr lang="hu-HU" dirty="0"/>
+              <a:t>szervezi, ütemezi a processzor egész </a:t>
+            </a:r>
+            <a:r>
+              <a:rPr lang="hu-HU" dirty="0" smtClean="0"/>
+              <a:t>munkáját</a:t>
+            </a:r>
+          </a:p>
+          <a:p>
+            <a:pPr lvl="0"/>
+            <a:r>
+              <a:rPr lang="hu-HU" dirty="0" smtClean="0"/>
+              <a:t>lehívja </a:t>
+            </a:r>
+            <a:r>
+              <a:rPr lang="hu-HU" dirty="0"/>
+              <a:t>a memóriából a soron következő utasítást, értelmezi és </a:t>
+            </a:r>
+            <a:r>
+              <a:rPr lang="hu-HU" dirty="0" err="1"/>
+              <a:t>végrehajtatja</a:t>
+            </a:r>
+            <a:r>
+              <a:rPr lang="hu-HU" dirty="0"/>
+              <a:t> azt, majd meghatározza a következő utasítás </a:t>
+            </a:r>
+            <a:r>
+              <a:rPr lang="hu-HU" dirty="0" smtClean="0"/>
+              <a:t>címét</a:t>
+            </a:r>
+          </a:p>
+          <a:p>
+            <a:pPr marL="0" lvl="0" indent="0">
+              <a:buNone/>
+            </a:pPr>
+            <a:endParaRPr lang="hu-HU" dirty="0"/>
+          </a:p>
+          <a:p>
+            <a:pPr marL="0" lvl="0" indent="0">
+              <a:buNone/>
+            </a:pPr>
+            <a:r>
               <a:rPr lang="hu-HU" b="1" dirty="0"/>
-            </a:br>
-            <a:endParaRPr lang="hu-HU" dirty="0"/>
-          </a:p>
-        </p:txBody>
-      </p:sp>
-      <p:pic>
-        <p:nvPicPr>
-          <p:cNvPr id="4" name="Tartalom helye 3"/>
-          <p:cNvPicPr>
-            <a:picLocks noGrp="1" noChangeAspect="1"/>
-          </p:cNvPicPr>
-          <p:nvPr>
-            <p:ph idx="1"/>
-          </p:nvPr>
-        </p:nvPicPr>
-        <p:blipFill>
-          <a:blip r:embed="rId2"/>
-          <a:stretch>
-            <a:fillRect/>
-          </a:stretch>
-        </p:blipFill>
-        <p:spPr>
-          <a:xfrm>
-            <a:off x="992750" y="1690688"/>
-            <a:ext cx="3601304" cy="4351338"/>
-          </a:xfrm>
-          <a:prstGeom prst="rect">
-            <a:avLst/>
-          </a:prstGeom>
-        </p:spPr>
-      </p:pic>
-      <p:sp>
-        <p:nvSpPr>
-          <p:cNvPr id="5" name="Téglalap 4"/>
-          <p:cNvSpPr/>
-          <p:nvPr/>
-        </p:nvSpPr>
-        <p:spPr>
-          <a:xfrm>
-            <a:off x="6340735" y="2474259"/>
-            <a:ext cx="5013065" cy="1754326"/>
-          </a:xfrm>
-          <a:prstGeom prst="rect">
-            <a:avLst/>
-          </a:prstGeom>
-        </p:spPr>
-        <p:txBody>
-          <a:bodyPr wrap="square">
-            <a:spAutoFit/>
-          </a:bodyPr>
-          <a:lstStyle/>
-          <a:p>
+              <a:t>Regiszter </a:t>
+            </a:r>
             <a:r>
               <a:rPr lang="hu-HU" dirty="0"/>
-              <a:t>Több szoftver is képes részletes hőmérsékletértékeket kijelezni Windows alatt. </a:t>
-            </a:r>
-            <a:endParaRPr lang="hu-HU" dirty="0" smtClean="0"/>
-          </a:p>
-          <a:p>
-            <a:endParaRPr lang="hu-HU" dirty="0" smtClean="0"/>
-          </a:p>
-          <a:p>
+              <a:t>(</a:t>
+            </a:r>
+            <a:r>
+              <a:rPr lang="hu-HU" dirty="0" err="1"/>
+              <a:t>Register</a:t>
+            </a:r>
+            <a:r>
+              <a:rPr lang="hu-HU" dirty="0" smtClean="0"/>
+              <a:t>):</a:t>
+            </a:r>
+          </a:p>
+          <a:p>
+            <a:pPr lvl="0"/>
             <a:r>
               <a:rPr lang="hu-HU" dirty="0" smtClean="0"/>
               <a:t>A </a:t>
             </a:r>
             <a:r>
-              <a:rPr lang="hu-HU" dirty="0" err="1"/>
-              <a:t>Core</a:t>
-            </a:r>
-            <a:r>
               <a:rPr lang="hu-HU" dirty="0"/>
-              <a:t> </a:t>
-            </a:r>
-            <a:r>
-              <a:rPr lang="hu-HU" dirty="0" err="1"/>
-              <a:t>Temp</a:t>
-            </a:r>
-            <a:r>
-              <a:rPr lang="hu-HU" dirty="0"/>
-              <a:t>, a </a:t>
-            </a:r>
-            <a:r>
-              <a:rPr lang="hu-HU" dirty="0" err="1"/>
-              <a:t>HWInfo</a:t>
-            </a:r>
-            <a:r>
-              <a:rPr lang="hu-HU" dirty="0"/>
-              <a:t> vagy az NZXT </a:t>
-            </a:r>
-            <a:r>
-              <a:rPr lang="hu-HU" dirty="0" err="1"/>
-              <a:t>Cam</a:t>
-            </a:r>
-            <a:r>
-              <a:rPr lang="hu-HU" dirty="0"/>
-              <a:t> mind kiváló </a:t>
-            </a:r>
-            <a:r>
-              <a:rPr lang="hu-HU" dirty="0" smtClean="0"/>
-              <a:t>segédprogramok amik veszély </a:t>
-            </a:r>
-            <a:r>
-              <a:rPr lang="hu-HU" dirty="0"/>
-              <a:t>esetén riasztanak.</a:t>
-            </a:r>
+              <a:t>regiszter a processzorba beépített nagyon gyors elérésű, kis méretű memória</a:t>
+            </a:r>
+            <a:r>
+              <a:rPr lang="hu-HU"/>
+              <a:t>. </a:t>
+            </a:r>
+            <a:endParaRPr lang="hu-HU" dirty="0"/>
           </a:p>
         </p:txBody>
       </p:sp>
     </p:spTree>
     <p:extLst>
       <p:ext uri="{BB962C8B-B14F-4D97-AF65-F5344CB8AC3E}">
-        <p14:creationId xmlns:p14="http://schemas.microsoft.com/office/powerpoint/2010/main" val="3639232973"/>
+        <p14:creationId xmlns:p14="http://schemas.microsoft.com/office/powerpoint/2010/main" val="4091424038"/>
       </p:ext>
     </p:extLst>
   </p:cSld>
@@ -4223,74 +4306,72 @@
         </p:nvSpPr>
         <p:spPr/>
         <p:txBody>
-          <a:bodyPr/>
-          <a:lstStyle/>
-          <a:p>
-            <a:r>
-              <a:rPr lang="hu-HU" sz="3200" b="1" dirty="0"/>
-              <a:t>A ventilátorok ellenőrzése</a:t>
-            </a:r>
-            <a:r>
-              <a:rPr lang="hu-HU" b="1" dirty="0"/>
-              <a:t/>
+          <a:bodyPr>
+            <a:normAutofit fontScale="90000"/>
+          </a:bodyPr>
+          <a:lstStyle/>
+          <a:p>
+            <a:r>
+              <a:rPr lang="hu-HU" dirty="0"/>
+              <a:t>Hatással van a magas hőmérséklet a CPU élettartamára vagy stabilitására?</a:t>
             </a:r>
             <a:br>
-              <a:rPr lang="hu-HU" b="1" dirty="0"/>
+              <a:rPr lang="hu-HU" dirty="0"/>
             </a:br>
             <a:endParaRPr lang="hu-HU" dirty="0"/>
           </a:p>
         </p:txBody>
       </p:sp>
-      <p:pic>
-        <p:nvPicPr>
-          <p:cNvPr id="4" name="Tartalom helye 3"/>
-          <p:cNvPicPr>
-            <a:picLocks noGrp="1" noChangeAspect="1"/>
-          </p:cNvPicPr>
+      <p:sp>
+        <p:nvSpPr>
+          <p:cNvPr id="3" name="Tartalom helye 2"/>
+          <p:cNvSpPr>
+            <a:spLocks noGrp="1"/>
+          </p:cNvSpPr>
           <p:nvPr>
             <p:ph idx="1"/>
           </p:nvPr>
-        </p:nvPicPr>
-        <p:blipFill>
-          <a:blip r:embed="rId2"/>
-          <a:stretch>
-            <a:fillRect/>
-          </a:stretch>
-        </p:blipFill>
-        <p:spPr>
-          <a:xfrm>
-            <a:off x="703946" y="1690688"/>
-            <a:ext cx="5004779" cy="4767711"/>
-          </a:xfrm>
-          <a:prstGeom prst="rect">
-            <a:avLst/>
-          </a:prstGeom>
-        </p:spPr>
-      </p:pic>
-      <p:sp>
-        <p:nvSpPr>
-          <p:cNvPr id="5" name="Téglalap 4"/>
-          <p:cNvSpPr/>
-          <p:nvPr/>
-        </p:nvSpPr>
-        <p:spPr>
-          <a:xfrm>
-            <a:off x="6910892" y="2960090"/>
-            <a:ext cx="4281544" cy="1200329"/>
-          </a:xfrm>
-          <a:prstGeom prst="rect">
-            <a:avLst/>
-          </a:prstGeom>
-        </p:spPr>
-        <p:txBody>
-          <a:bodyPr wrap="square">
-            <a:spAutoFit/>
+        </p:nvSpPr>
+        <p:spPr/>
+        <p:txBody>
+          <a:bodyPr>
+            <a:normAutofit/>
           </a:bodyPr>
           <a:lstStyle/>
           <a:p>
             <a:r>
-              <a:rPr lang="hu-HU" dirty="0"/>
-              <a:t>A CPU-magok vagy a tok magas hőmérsékletének elsődleges oka az elégtelen, meghibásodott hűtés lehet, ezért ellenőrizd a ventilátorok fordulatszámát. </a:t>
+              <a:rPr lang="hu-HU" sz="2000" dirty="0"/>
+              <a:t>Amíg a hőmérséklet alacsonyabb az Intel által meghatározott eredeti standardnál (105 vagy 100 Celsius-fok), az a CPU élettartamára nem lesz hatással. </a:t>
+            </a:r>
+            <a:endParaRPr lang="hu-HU" sz="2000" dirty="0" smtClean="0"/>
+          </a:p>
+          <a:p>
+            <a:r>
+              <a:rPr lang="hu-HU" sz="2000" dirty="0" smtClean="0"/>
+              <a:t> </a:t>
+            </a:r>
+            <a:r>
+              <a:rPr lang="hu-HU" sz="2000" dirty="0"/>
+              <a:t>A CPU </a:t>
+            </a:r>
+            <a:r>
+              <a:rPr lang="hu-HU" sz="2000" dirty="0" smtClean="0"/>
+              <a:t>saját </a:t>
+            </a:r>
+            <a:r>
+              <a:rPr lang="hu-HU" sz="2000" dirty="0"/>
+              <a:t>védelmi rendszerrel, védőmechanizmussal rendelkezik. </a:t>
+            </a:r>
+            <a:endParaRPr lang="hu-HU" sz="2000" dirty="0" smtClean="0"/>
+          </a:p>
+          <a:p>
+            <a:r>
+              <a:rPr lang="hu-HU" sz="2000" dirty="0" smtClean="0"/>
+              <a:t>Ha </a:t>
+            </a:r>
+            <a:r>
+              <a:rPr lang="hu-HU" sz="2000" dirty="0"/>
+              <a:t>a mag hőmérséklete meghaladja az előzőleg meghatározott hőmérsékletet, a gép teljesítménye a biztonságos hőmérséklet fenntartása érdekében csökken.</a:t>
             </a:r>
           </a:p>
         </p:txBody>
@@ -4298,7 +4379,7 @@
     </p:spTree>
     <p:extLst>
       <p:ext uri="{BB962C8B-B14F-4D97-AF65-F5344CB8AC3E}">
-        <p14:creationId xmlns:p14="http://schemas.microsoft.com/office/powerpoint/2010/main" val="1662481453"/>
+        <p14:creationId xmlns:p14="http://schemas.microsoft.com/office/powerpoint/2010/main" val="3982985037"/>
       </p:ext>
     </p:extLst>
   </p:cSld>
@@ -4341,137 +4422,242 @@
           <a:lstStyle/>
           <a:p>
             <a:r>
+              <a:rPr lang="hu-HU" sz="3600" b="1" dirty="0"/>
+              <a:t>A hőmérséklet kijelzése</a:t>
+            </a:r>
+            <a:r>
+              <a:rPr lang="hu-HU" b="1" dirty="0"/>
+              <a:t/>
+            </a:r>
+            <a:br>
+              <a:rPr lang="hu-HU" b="1" dirty="0"/>
+            </a:br>
+            <a:endParaRPr lang="hu-HU" dirty="0"/>
+          </a:p>
+        </p:txBody>
+      </p:sp>
+      <p:pic>
+        <p:nvPicPr>
+          <p:cNvPr id="4" name="Tartalom helye 3"/>
+          <p:cNvPicPr>
+            <a:picLocks noGrp="1" noChangeAspect="1"/>
+          </p:cNvPicPr>
+          <p:nvPr>
+            <p:ph idx="1"/>
+          </p:nvPr>
+        </p:nvPicPr>
+        <p:blipFill>
+          <a:blip r:embed="rId2"/>
+          <a:stretch>
+            <a:fillRect/>
+          </a:stretch>
+        </p:blipFill>
+        <p:spPr>
+          <a:xfrm>
+            <a:off x="992750" y="1690688"/>
+            <a:ext cx="3601304" cy="4351338"/>
+          </a:xfrm>
+          <a:prstGeom prst="rect">
+            <a:avLst/>
+          </a:prstGeom>
+        </p:spPr>
+      </p:pic>
+      <p:sp>
+        <p:nvSpPr>
+          <p:cNvPr id="5" name="Téglalap 4"/>
+          <p:cNvSpPr/>
+          <p:nvPr/>
+        </p:nvSpPr>
+        <p:spPr>
+          <a:xfrm>
+            <a:off x="6340735" y="2474259"/>
+            <a:ext cx="5013065" cy="1754326"/>
+          </a:xfrm>
+          <a:prstGeom prst="rect">
+            <a:avLst/>
+          </a:prstGeom>
+        </p:spPr>
+        <p:txBody>
+          <a:bodyPr wrap="square">
+            <a:spAutoFit/>
+          </a:bodyPr>
+          <a:lstStyle/>
+          <a:p>
+            <a:r>
+              <a:rPr lang="hu-HU" dirty="0"/>
+              <a:t>Több szoftver is képes részletes hőmérsékletértékeket kijelezni Windows alatt. </a:t>
+            </a:r>
+            <a:endParaRPr lang="hu-HU" dirty="0" smtClean="0"/>
+          </a:p>
+          <a:p>
+            <a:endParaRPr lang="hu-HU" dirty="0" smtClean="0"/>
+          </a:p>
+          <a:p>
+            <a:r>
               <a:rPr lang="hu-HU" dirty="0" smtClean="0"/>
-              <a:t>Források</a:t>
-            </a:r>
-            <a:endParaRPr lang="hu-HU" dirty="0"/>
-          </a:p>
-        </p:txBody>
-      </p:sp>
-      <p:sp>
-        <p:nvSpPr>
-          <p:cNvPr id="3" name="Tartalom helye 2"/>
-          <p:cNvSpPr>
-            <a:spLocks noGrp="1"/>
-          </p:cNvSpPr>
-          <p:nvPr>
-            <p:ph idx="1"/>
-          </p:nvPr>
-        </p:nvSpPr>
-        <p:spPr/>
-        <p:txBody>
-          <a:bodyPr>
-            <a:normAutofit fontScale="92500" lnSpcReduction="20000"/>
-          </a:bodyPr>
-          <a:lstStyle/>
-          <a:p>
-            <a:pPr marL="0" indent="0">
-              <a:buNone/>
-            </a:pPr>
-            <a:r>
-              <a:rPr lang="hu-HU" u="sng" dirty="0" smtClean="0">
-                <a:hlinkClick r:id="rId2"/>
-              </a:rPr>
-              <a:t>https</a:t>
-            </a:r>
-            <a:r>
-              <a:rPr lang="hu-HU" u="sng" dirty="0">
-                <a:hlinkClick r:id="rId2"/>
-              </a:rPr>
-              <a:t>://bestofcafe.hu/mi_a_ram.html</a:t>
-            </a:r>
-            <a:endParaRPr lang="hu-HU" dirty="0"/>
-          </a:p>
-          <a:p>
-            <a:pPr marL="0" indent="0">
-              <a:buNone/>
-            </a:pPr>
-            <a:r>
-              <a:rPr lang="hu-HU" u="sng" dirty="0">
-                <a:hlinkClick r:id="rId3"/>
-              </a:rPr>
-              <a:t>https://www.pcx.hu/Minden-amit-RAM-tudni-erdemes-1</a:t>
-            </a:r>
-            <a:endParaRPr lang="hu-HU" dirty="0"/>
-          </a:p>
-          <a:p>
-            <a:pPr marL="0" indent="0">
-              <a:buNone/>
-            </a:pPr>
-            <a:r>
-              <a:rPr lang="hu-HU" u="sng" dirty="0">
-                <a:hlinkClick r:id="rId4"/>
-              </a:rPr>
-              <a:t>https://hu.wikipedia.org/wiki/Mem%C3%B3ria_(sz%C3%A1m%C3%ADt%C3%A1stechnika)</a:t>
-            </a:r>
-            <a:endParaRPr lang="hu-HU" dirty="0"/>
-          </a:p>
-          <a:p>
-            <a:pPr marL="0" indent="0">
-              <a:buNone/>
-            </a:pPr>
-            <a:r>
-              <a:rPr lang="hu-HU" u="sng" dirty="0">
-                <a:hlinkClick r:id="rId5"/>
-              </a:rPr>
-              <a:t>https://www.alza.hu/fogalomtar/ram-memoria-tipusok</a:t>
-            </a:r>
-            <a:endParaRPr lang="hu-HU" dirty="0"/>
-          </a:p>
-          <a:p>
-            <a:pPr marL="0" indent="0">
-              <a:buNone/>
-            </a:pPr>
-            <a:r>
-              <a:rPr lang="hu-HU" dirty="0" smtClean="0">
-                <a:hlinkClick r:id="rId6"/>
-              </a:rPr>
-              <a:t>https://nagyker.pcarena.hu/blog/celkeresztben-a-ram-ddr-ddr2-ddr3-ddr4-es-ddr5-</a:t>
-            </a:r>
-            <a:endParaRPr lang="hu-HU" dirty="0" smtClean="0"/>
-          </a:p>
-          <a:p>
-            <a:pPr marL="0" indent="0">
-              <a:buNone/>
-            </a:pPr>
-            <a:r>
-              <a:rPr lang="hu-HU" dirty="0" smtClean="0">
-                <a:hlinkClick r:id="rId7"/>
-              </a:rPr>
-              <a:t>https://hu.eferrit.com/a-szamitogep-memoriajanak-toertenete/</a:t>
-            </a:r>
-            <a:endParaRPr lang="hu-HU" dirty="0" smtClean="0"/>
-          </a:p>
-          <a:p>
-            <a:pPr marL="0" indent="0">
-              <a:buNone/>
-            </a:pPr>
-            <a:endParaRPr lang="hu-HU" dirty="0" smtClean="0"/>
-          </a:p>
-          <a:p>
-            <a:pPr marL="0" indent="0">
-              <a:buNone/>
-            </a:pPr>
-            <a:endParaRPr lang="hu-HU" dirty="0"/>
-          </a:p>
-          <a:p>
-            <a:pPr marL="0" indent="0">
-              <a:buNone/>
-            </a:pPr>
+              <a:t>A </a:t>
+            </a:r>
+            <a:r>
+              <a:rPr lang="hu-HU" dirty="0" err="1"/>
+              <a:t>Core</a:t>
+            </a:r>
             <a:r>
               <a:rPr lang="hu-HU" dirty="0"/>
-              <a:t> </a:t>
-            </a:r>
-          </a:p>
-          <a:p>
-            <a:endParaRPr lang="hu-HU" dirty="0"/>
+              <a:t> </a:t>
+            </a:r>
+            <a:r>
+              <a:rPr lang="hu-HU" dirty="0" err="1"/>
+              <a:t>Temp</a:t>
+            </a:r>
+            <a:r>
+              <a:rPr lang="hu-HU" dirty="0"/>
+              <a:t>, a </a:t>
+            </a:r>
+            <a:r>
+              <a:rPr lang="hu-HU" dirty="0" err="1"/>
+              <a:t>HWInfo</a:t>
+            </a:r>
+            <a:r>
+              <a:rPr lang="hu-HU" dirty="0"/>
+              <a:t> vagy az NZXT </a:t>
+            </a:r>
+            <a:r>
+              <a:rPr lang="hu-HU" dirty="0" err="1"/>
+              <a:t>Cam</a:t>
+            </a:r>
+            <a:r>
+              <a:rPr lang="hu-HU" dirty="0"/>
+              <a:t> mind kiváló </a:t>
+            </a:r>
+            <a:r>
+              <a:rPr lang="hu-HU" dirty="0" smtClean="0"/>
+              <a:t>segédprogramok amik veszély </a:t>
+            </a:r>
+            <a:r>
+              <a:rPr lang="hu-HU" dirty="0"/>
+              <a:t>esetén riasztanak.</a:t>
+            </a:r>
           </a:p>
         </p:txBody>
       </p:sp>
     </p:spTree>
     <p:extLst>
       <p:ext uri="{BB962C8B-B14F-4D97-AF65-F5344CB8AC3E}">
-        <p14:creationId xmlns:p14="http://schemas.microsoft.com/office/powerpoint/2010/main" val="340674235"/>
+        <p14:creationId xmlns:p14="http://schemas.microsoft.com/office/powerpoint/2010/main" val="3639232973"/>
+      </p:ext>
+    </p:extLst>
+  </p:cSld>
+  <p:clrMapOvr>
+    <a:masterClrMapping/>
+  </p:clrMapOvr>
+</p:sld>
+</file>
+
+<file path=ppt/slides/slide19.xml><?xml version="1.0" encoding="utf-8"?>
+<p:sld xmlns:a="http://schemas.openxmlformats.org/drawingml/2006/main" xmlns:r="http://schemas.openxmlformats.org/officeDocument/2006/relationships" xmlns:p="http://schemas.openxmlformats.org/presentationml/2006/main">
+  <p:cSld>
+    <p:spTree>
+      <p:nvGrpSpPr>
+        <p:cNvPr id="1" name=""/>
+        <p:cNvGrpSpPr/>
+        <p:nvPr/>
+      </p:nvGrpSpPr>
+      <p:grpSpPr>
+        <a:xfrm>
+          <a:off x="0" y="0"/>
+          <a:ext cx="0" cy="0"/>
+          <a:chOff x="0" y="0"/>
+          <a:chExt cx="0" cy="0"/>
+        </a:xfrm>
+      </p:grpSpPr>
+      <p:sp>
+        <p:nvSpPr>
+          <p:cNvPr id="2" name="Cím 1"/>
+          <p:cNvSpPr>
+            <a:spLocks noGrp="1"/>
+          </p:cNvSpPr>
+          <p:nvPr>
+            <p:ph type="title"/>
+          </p:nvPr>
+        </p:nvSpPr>
+        <p:spPr/>
+        <p:txBody>
+          <a:bodyPr/>
+          <a:lstStyle/>
+          <a:p>
+            <a:r>
+              <a:rPr lang="hu-HU" sz="3200" b="1" dirty="0"/>
+              <a:t>A ventilátorok ellenőrzése</a:t>
+            </a:r>
+            <a:r>
+              <a:rPr lang="hu-HU" b="1" dirty="0"/>
+              <a:t/>
+            </a:r>
+            <a:br>
+              <a:rPr lang="hu-HU" b="1" dirty="0"/>
+            </a:br>
+            <a:endParaRPr lang="hu-HU" dirty="0"/>
+          </a:p>
+        </p:txBody>
+      </p:sp>
+      <p:pic>
+        <p:nvPicPr>
+          <p:cNvPr id="4" name="Tartalom helye 3"/>
+          <p:cNvPicPr>
+            <a:picLocks noGrp="1" noChangeAspect="1"/>
+          </p:cNvPicPr>
+          <p:nvPr>
+            <p:ph idx="1"/>
+          </p:nvPr>
+        </p:nvPicPr>
+        <p:blipFill>
+          <a:blip r:embed="rId2"/>
+          <a:stretch>
+            <a:fillRect/>
+          </a:stretch>
+        </p:blipFill>
+        <p:spPr>
+          <a:xfrm>
+            <a:off x="703946" y="1690688"/>
+            <a:ext cx="5004779" cy="4767711"/>
+          </a:xfrm>
+          <a:prstGeom prst="rect">
+            <a:avLst/>
+          </a:prstGeom>
+        </p:spPr>
+      </p:pic>
+      <p:sp>
+        <p:nvSpPr>
+          <p:cNvPr id="5" name="Téglalap 4"/>
+          <p:cNvSpPr/>
+          <p:nvPr/>
+        </p:nvSpPr>
+        <p:spPr>
+          <a:xfrm>
+            <a:off x="6910892" y="2960090"/>
+            <a:ext cx="4281544" cy="1200329"/>
+          </a:xfrm>
+          <a:prstGeom prst="rect">
+            <a:avLst/>
+          </a:prstGeom>
+        </p:spPr>
+        <p:txBody>
+          <a:bodyPr wrap="square">
+            <a:spAutoFit/>
+          </a:bodyPr>
+          <a:lstStyle/>
+          <a:p>
+            <a:r>
+              <a:rPr lang="hu-HU" dirty="0"/>
+              <a:t>A CPU-magok vagy a tok magas hőmérsékletének elsődleges oka az elégtelen, meghibásodott hűtés lehet, ezért ellenőrizd a ventilátorok fordulatszámát. </a:t>
+            </a:r>
+          </a:p>
+        </p:txBody>
+      </p:sp>
+    </p:spTree>
+    <p:extLst>
+      <p:ext uri="{BB962C8B-B14F-4D97-AF65-F5344CB8AC3E}">
+        <p14:creationId xmlns:p14="http://schemas.microsoft.com/office/powerpoint/2010/main" val="1662481453"/>
       </p:ext>
     </p:extLst>
   </p:cSld>
@@ -4617,6 +4803,179 @@
     <p:extLst>
       <p:ext uri="{BB962C8B-B14F-4D97-AF65-F5344CB8AC3E}">
         <p14:creationId xmlns:p14="http://schemas.microsoft.com/office/powerpoint/2010/main" val="828557871"/>
+      </p:ext>
+    </p:extLst>
+  </p:cSld>
+  <p:clrMapOvr>
+    <a:masterClrMapping/>
+  </p:clrMapOvr>
+</p:sld>
+</file>
+
+<file path=ppt/slides/slide20.xml><?xml version="1.0" encoding="utf-8"?>
+<p:sld xmlns:a="http://schemas.openxmlformats.org/drawingml/2006/main" xmlns:r="http://schemas.openxmlformats.org/officeDocument/2006/relationships" xmlns:p="http://schemas.openxmlformats.org/presentationml/2006/main">
+  <p:cSld>
+    <p:spTree>
+      <p:nvGrpSpPr>
+        <p:cNvPr id="1" name=""/>
+        <p:cNvGrpSpPr/>
+        <p:nvPr/>
+      </p:nvGrpSpPr>
+      <p:grpSpPr>
+        <a:xfrm>
+          <a:off x="0" y="0"/>
+          <a:ext cx="0" cy="0"/>
+          <a:chOff x="0" y="0"/>
+          <a:chExt cx="0" cy="0"/>
+        </a:xfrm>
+      </p:grpSpPr>
+      <p:sp>
+        <p:nvSpPr>
+          <p:cNvPr id="2" name="Cím 1"/>
+          <p:cNvSpPr>
+            <a:spLocks noGrp="1"/>
+          </p:cNvSpPr>
+          <p:nvPr>
+            <p:ph type="title"/>
+          </p:nvPr>
+        </p:nvSpPr>
+        <p:spPr/>
+        <p:txBody>
+          <a:bodyPr/>
+          <a:lstStyle/>
+          <a:p>
+            <a:r>
+              <a:rPr lang="hu-HU" dirty="0" smtClean="0"/>
+              <a:t>Források</a:t>
+            </a:r>
+            <a:endParaRPr lang="hu-HU" dirty="0"/>
+          </a:p>
+        </p:txBody>
+      </p:sp>
+      <p:sp>
+        <p:nvSpPr>
+          <p:cNvPr id="3" name="Tartalom helye 2"/>
+          <p:cNvSpPr>
+            <a:spLocks noGrp="1"/>
+          </p:cNvSpPr>
+          <p:nvPr>
+            <p:ph idx="1"/>
+          </p:nvPr>
+        </p:nvSpPr>
+        <p:spPr/>
+        <p:txBody>
+          <a:bodyPr>
+            <a:normAutofit fontScale="92500" lnSpcReduction="20000"/>
+          </a:bodyPr>
+          <a:lstStyle/>
+          <a:p>
+            <a:pPr marL="0" indent="0">
+              <a:buNone/>
+            </a:pPr>
+            <a:r>
+              <a:rPr lang="hu-HU" u="sng" dirty="0" smtClean="0">
+                <a:hlinkClick r:id="rId2"/>
+              </a:rPr>
+              <a:t>https</a:t>
+            </a:r>
+            <a:r>
+              <a:rPr lang="hu-HU" u="sng" dirty="0">
+                <a:hlinkClick r:id="rId2"/>
+              </a:rPr>
+              <a:t>://bestofcafe.hu/mi_a_ram.html</a:t>
+            </a:r>
+            <a:endParaRPr lang="hu-HU" dirty="0"/>
+          </a:p>
+          <a:p>
+            <a:pPr marL="0" indent="0">
+              <a:buNone/>
+            </a:pPr>
+            <a:r>
+              <a:rPr lang="hu-HU" u="sng" dirty="0">
+                <a:hlinkClick r:id="rId3"/>
+              </a:rPr>
+              <a:t>https://www.pcx.hu/Minden-amit-RAM-tudni-erdemes-1</a:t>
+            </a:r>
+            <a:endParaRPr lang="hu-HU" dirty="0"/>
+          </a:p>
+          <a:p>
+            <a:pPr marL="0" indent="0">
+              <a:buNone/>
+            </a:pPr>
+            <a:r>
+              <a:rPr lang="hu-HU" u="sng" dirty="0">
+                <a:hlinkClick r:id="rId4"/>
+              </a:rPr>
+              <a:t>https://hu.wikipedia.org/wiki/Mem%C3%B3ria_(sz%C3%A1m%C3%ADt%C3%A1stechnika)</a:t>
+            </a:r>
+            <a:endParaRPr lang="hu-HU" dirty="0"/>
+          </a:p>
+          <a:p>
+            <a:pPr marL="0" indent="0">
+              <a:buNone/>
+            </a:pPr>
+            <a:r>
+              <a:rPr lang="hu-HU" u="sng" dirty="0">
+                <a:hlinkClick r:id="rId5"/>
+              </a:rPr>
+              <a:t>https://www.alza.hu/fogalomtar/ram-memoria-tipusok</a:t>
+            </a:r>
+            <a:endParaRPr lang="hu-HU" dirty="0"/>
+          </a:p>
+          <a:p>
+            <a:pPr marL="0" indent="0">
+              <a:buNone/>
+            </a:pPr>
+            <a:r>
+              <a:rPr lang="hu-HU" dirty="0" smtClean="0">
+                <a:hlinkClick r:id="rId6"/>
+              </a:rPr>
+              <a:t>https://nagyker.pcarena.hu/blog/celkeresztben-a-ram-ddr-ddr2-ddr3-ddr4-es-ddr5-</a:t>
+            </a:r>
+            <a:endParaRPr lang="hu-HU" dirty="0" smtClean="0"/>
+          </a:p>
+          <a:p>
+            <a:pPr marL="0" indent="0">
+              <a:buNone/>
+            </a:pPr>
+            <a:r>
+              <a:rPr lang="hu-HU" dirty="0" smtClean="0">
+                <a:hlinkClick r:id="rId7"/>
+              </a:rPr>
+              <a:t>https://hu.eferrit.com/a-szamitogep-memoriajanak-toertenete/</a:t>
+            </a:r>
+            <a:endParaRPr lang="hu-HU" dirty="0" smtClean="0"/>
+          </a:p>
+          <a:p>
+            <a:pPr marL="0" indent="0">
+              <a:buNone/>
+            </a:pPr>
+            <a:endParaRPr lang="hu-HU" dirty="0" smtClean="0"/>
+          </a:p>
+          <a:p>
+            <a:pPr marL="0" indent="0">
+              <a:buNone/>
+            </a:pPr>
+            <a:endParaRPr lang="hu-HU" dirty="0"/>
+          </a:p>
+          <a:p>
+            <a:pPr marL="0" indent="0">
+              <a:buNone/>
+            </a:pPr>
+            <a:r>
+              <a:rPr lang="hu-HU" dirty="0"/>
+              <a:t> </a:t>
+            </a:r>
+          </a:p>
+          <a:p>
+            <a:endParaRPr lang="hu-HU" dirty="0"/>
+          </a:p>
+        </p:txBody>
+      </p:sp>
+    </p:spTree>
+    <p:extLst>
+      <p:ext uri="{BB962C8B-B14F-4D97-AF65-F5344CB8AC3E}">
+        <p14:creationId xmlns:p14="http://schemas.microsoft.com/office/powerpoint/2010/main" val="340674235"/>
       </p:ext>
     </p:extLst>
   </p:cSld>

</xml_diff>